<commit_message>
Docker-monivalintatehtävien materiaalilinkkejä ja materiaaleja parannettu
</commit_message>
<xml_diff>
--- a/01_docker/DockerConceptsAndVocabulary.pptx
+++ b/01_docker/DockerConceptsAndVocabulary.pptx
@@ -5,7 +5,7 @@
     <p:sldMasterId id="2147483648" r:id="rId4"/>
   </p:sldMasterIdLst>
   <p:notesMasterIdLst>
-    <p:notesMasterId r:id="rId22"/>
+    <p:notesMasterId r:id="rId23"/>
   </p:notesMasterIdLst>
   <p:sldIdLst>
     <p:sldId id="256" r:id="rId5"/>
@@ -13,18 +13,19 @@
     <p:sldId id="281" r:id="rId7"/>
     <p:sldId id="282" r:id="rId8"/>
     <p:sldId id="268" r:id="rId9"/>
-    <p:sldId id="269" r:id="rId10"/>
-    <p:sldId id="270" r:id="rId11"/>
-    <p:sldId id="280" r:id="rId12"/>
-    <p:sldId id="272" r:id="rId13"/>
-    <p:sldId id="271" r:id="rId14"/>
-    <p:sldId id="274" r:id="rId15"/>
-    <p:sldId id="273" r:id="rId16"/>
-    <p:sldId id="276" r:id="rId17"/>
-    <p:sldId id="278" r:id="rId18"/>
-    <p:sldId id="277" r:id="rId19"/>
-    <p:sldId id="279" r:id="rId20"/>
-    <p:sldId id="266" r:id="rId21"/>
+    <p:sldId id="283" r:id="rId10"/>
+    <p:sldId id="269" r:id="rId11"/>
+    <p:sldId id="270" r:id="rId12"/>
+    <p:sldId id="280" r:id="rId13"/>
+    <p:sldId id="272" r:id="rId14"/>
+    <p:sldId id="271" r:id="rId15"/>
+    <p:sldId id="274" r:id="rId16"/>
+    <p:sldId id="273" r:id="rId17"/>
+    <p:sldId id="276" r:id="rId18"/>
+    <p:sldId id="278" r:id="rId19"/>
+    <p:sldId id="277" r:id="rId20"/>
+    <p:sldId id="279" r:id="rId21"/>
+    <p:sldId id="266" r:id="rId22"/>
   </p:sldIdLst>
   <p:sldSz cx="12192000" cy="6858000"/>
   <p:notesSz cx="6858000" cy="9144000"/>
@@ -1207,7 +1208,7 @@
           <a:p>
             <a:fld id="{5645C365-1C26-6946-87AF-75D6A7DF4277}" type="datetimeFigureOut">
               <a:rPr lang="en-GB" smtClean="0"/>
-              <a:t>25/01/2024</a:t>
+              <a:t>18/02/2024</a:t>
             </a:fld>
             <a:endParaRPr lang="en-GB"/>
           </a:p>
@@ -1706,7 +1707,7 @@
           <a:p>
             <a:fld id="{35B864B8-8D08-7B43-B4FB-B2FB41A5D9E3}" type="datetime1">
               <a:rPr lang="fi-FI" smtClean="0"/>
-              <a:t>25.1.2024</a:t>
+              <a:t>18.2.2024</a:t>
             </a:fld>
             <a:endParaRPr lang="en-GB" dirty="0"/>
           </a:p>
@@ -2033,7 +2034,7 @@
           <a:p>
             <a:fld id="{D5AEA85A-FC56-D34C-9AA6-ECC3D2586F37}" type="datetime1">
               <a:rPr lang="fi-FI" smtClean="0"/>
-              <a:t>25.1.2024</a:t>
+              <a:t>18.2.2024</a:t>
             </a:fld>
             <a:endParaRPr lang="en-GB" dirty="0"/>
           </a:p>
@@ -2243,7 +2244,7 @@
           <a:p>
             <a:fld id="{E6BC6EEF-E660-7844-8930-418AFF95EA40}" type="datetime1">
               <a:rPr lang="fi-FI" smtClean="0"/>
-              <a:t>25.1.2024</a:t>
+              <a:t>18.2.2024</a:t>
             </a:fld>
             <a:endParaRPr lang="en-GB" dirty="0"/>
           </a:p>
@@ -2552,7 +2553,7 @@
           <a:p>
             <a:fld id="{4E10C7EC-C1C1-9849-A573-7692478FCD52}" type="datetime1">
               <a:rPr lang="fi-FI" smtClean="0"/>
-              <a:t>25.1.2024</a:t>
+              <a:t>18.2.2024</a:t>
             </a:fld>
             <a:endParaRPr lang="en-GB" dirty="0"/>
           </a:p>
@@ -2825,7 +2826,7 @@
           <a:p>
             <a:fld id="{844FF3FE-30BE-2040-9151-6FBC4992BF4F}" type="datetime1">
               <a:rPr lang="fi-FI" smtClean="0"/>
-              <a:t>25.1.2024</a:t>
+              <a:t>18.2.2024</a:t>
             </a:fld>
             <a:endParaRPr lang="en-GB" dirty="0"/>
           </a:p>
@@ -3065,7 +3066,7 @@
           <a:p>
             <a:fld id="{11EDCD7B-6966-E249-89F2-D46BDFBF56BE}" type="datetime1">
               <a:rPr lang="fi-FI" smtClean="0"/>
-              <a:t>25.1.2024</a:t>
+              <a:t>18.2.2024</a:t>
             </a:fld>
             <a:endParaRPr lang="en-GB" dirty="0"/>
           </a:p>
@@ -3358,7 +3359,7 @@
           <a:p>
             <a:fld id="{11EDCD7B-6966-E249-89F2-D46BDFBF56BE}" type="datetime1">
               <a:rPr lang="fi-FI" smtClean="0"/>
-              <a:t>25.1.2024</a:t>
+              <a:t>18.2.2024</a:t>
             </a:fld>
             <a:endParaRPr lang="en-GB" dirty="0"/>
           </a:p>
@@ -3797,7 +3798,7 @@
           <a:p>
             <a:fld id="{844FF3FE-30BE-2040-9151-6FBC4992BF4F}" type="datetime1">
               <a:rPr lang="fi-FI" smtClean="0"/>
-              <a:t>25.1.2024</a:t>
+              <a:t>18.2.2024</a:t>
             </a:fld>
             <a:endParaRPr lang="en-GB" dirty="0"/>
           </a:p>
@@ -4025,7 +4026,7 @@
           <a:p>
             <a:fld id="{11EDCD7B-6966-E249-89F2-D46BDFBF56BE}" type="datetime1">
               <a:rPr lang="fi-FI" smtClean="0"/>
-              <a:t>25.1.2024</a:t>
+              <a:t>18.2.2024</a:t>
             </a:fld>
             <a:endParaRPr lang="en-GB" dirty="0"/>
           </a:p>
@@ -4440,7 +4441,7 @@
           <a:p>
             <a:fld id="{B62E192A-D52B-F541-B2AA-4AEB9388F1F7}" type="datetime1">
               <a:rPr lang="fi-FI" smtClean="0"/>
-              <a:t>25.1.2024</a:t>
+              <a:t>18.2.2024</a:t>
             </a:fld>
             <a:endParaRPr lang="en-GB" dirty="0"/>
           </a:p>
@@ -4740,7 +4741,7 @@
           <a:p>
             <a:fld id="{EEA4FAA2-2B3E-264C-A42F-2D6D3EF33A3C}" type="datetime1">
               <a:rPr lang="fi-FI" smtClean="0"/>
-              <a:t>25.1.2024</a:t>
+              <a:t>18.2.2024</a:t>
             </a:fld>
             <a:endParaRPr lang="en-GB" dirty="0"/>
           </a:p>
@@ -5643,7 +5644,7 @@
           <a:p>
             <a:fld id="{B3114A65-8017-1743-A85A-B2A4BB835AE9}" type="datetime1">
               <a:rPr lang="fi-FI" smtClean="0"/>
-              <a:t>25.1.2024</a:t>
+              <a:t>18.2.2024</a:t>
             </a:fld>
             <a:endParaRPr lang="en-GB" dirty="0"/>
           </a:p>
@@ -5871,7 +5872,7 @@
           <a:p>
             <a:fld id="{11EDCD7B-6966-E249-89F2-D46BDFBF56BE}" type="datetime1">
               <a:rPr lang="fi-FI" smtClean="0"/>
-              <a:t>25.1.2024</a:t>
+              <a:t>18.2.2024</a:t>
             </a:fld>
             <a:endParaRPr lang="en-GB" dirty="0"/>
           </a:p>
@@ -6163,7 +6164,7 @@
           <a:p>
             <a:fld id="{45F98643-D206-614D-B596-3C8548138211}" type="datetime1">
               <a:rPr lang="fi-FI" smtClean="0"/>
-              <a:t>25.1.2024</a:t>
+              <a:t>18.2.2024</a:t>
             </a:fld>
             <a:endParaRPr lang="en-GB" dirty="0"/>
           </a:p>
@@ -6803,7 +6804,7 @@
           <a:p>
             <a:fld id="{30BF63A1-919F-FB49-ABA8-182126D24C50}" type="datetime1">
               <a:rPr lang="fi-FI" smtClean="0"/>
-              <a:t>25.1.2024</a:t>
+              <a:t>18.2.2024</a:t>
             </a:fld>
             <a:endParaRPr lang="en-GB" dirty="0"/>
           </a:p>
@@ -6887,8 +6888,13 @@
           <a:p>
             <a:r>
               <a:rPr lang="fi-FI" dirty="0"/>
-              <a:t>image</a:t>
-            </a:r>
+              <a:t>.</a:t>
+            </a:r>
+            <a:r>
+              <a:rPr lang="fi-FI" dirty="0" err="1"/>
+              <a:t>dockerignore</a:t>
+            </a:r>
+            <a:endParaRPr lang="fi-FI" dirty="0"/>
           </a:p>
         </p:txBody>
       </p:sp>
@@ -6930,56 +6936,7 @@
                 <a:ea typeface="Calibri" panose="020F0502020204030204" pitchFamily="34" charset="0"/>
                 <a:cs typeface="Times New Roman" panose="02020603050405020304" pitchFamily="18" charset="0"/>
               </a:rPr>
-              <a:t>Ready-made from Docker Hub, or one you have created. Template that can be used to create container.</a:t>
-            </a:r>
-            <a:endParaRPr lang="fi-FI" sz="1800" dirty="0">
-              <a:effectLst/>
-              <a:latin typeface="Calibri" panose="020F0502020204030204" pitchFamily="34" charset="0"/>
-              <a:ea typeface="Calibri" panose="020F0502020204030204" pitchFamily="34" charset="0"/>
-              <a:cs typeface="Times New Roman" panose="02020603050405020304" pitchFamily="18" charset="0"/>
-            </a:endParaRPr>
-          </a:p>
-          <a:p>
-            <a:pPr>
-              <a:lnSpc>
-                <a:spcPct val="107000"/>
-              </a:lnSpc>
-              <a:spcAft>
-                <a:spcPts val="800"/>
-              </a:spcAft>
-            </a:pPr>
-            <a:r>
-              <a:rPr lang="en-US" sz="1800" dirty="0">
-                <a:effectLst/>
-                <a:latin typeface="Calibri" panose="020F0502020204030204" pitchFamily="34" charset="0"/>
-                <a:ea typeface="Calibri" panose="020F0502020204030204" pitchFamily="34" charset="0"/>
-                <a:cs typeface="Times New Roman" panose="02020603050405020304" pitchFamily="18" charset="0"/>
-              </a:rPr>
-              <a:t>E.g. some MariaDB image you want to take into use. It’s a snapshot of a running/runnable MariaDB or other DB server that starts from a certain documented state. Typically there is a root user with known password (public information, everyone knows the password!), a certain database/schema created, like ‘test’. When taking that image into use, you must then immediately:</a:t>
-            </a:r>
-            <a:endParaRPr lang="fi-FI" sz="1800" dirty="0">
-              <a:effectLst/>
-              <a:latin typeface="Calibri" panose="020F0502020204030204" pitchFamily="34" charset="0"/>
-              <a:ea typeface="Calibri" panose="020F0502020204030204" pitchFamily="34" charset="0"/>
-              <a:cs typeface="Times New Roman" panose="02020603050405020304" pitchFamily="18" charset="0"/>
-            </a:endParaRPr>
-          </a:p>
-          <a:p>
-            <a:pPr marL="846900" lvl="1" indent="-342900">
-              <a:lnSpc>
-                <a:spcPct val="107000"/>
-              </a:lnSpc>
-              <a:buFont typeface="Calibri" panose="020F0502020204030204" pitchFamily="34" charset="0"/>
-              <a:buChar char="-"/>
-            </a:pPr>
-            <a:r>
-              <a:rPr lang="en-US" dirty="0">
-                <a:effectLst/>
-                <a:latin typeface="Calibri" panose="020F0502020204030204" pitchFamily="34" charset="0"/>
-                <a:ea typeface="Calibri" panose="020F0502020204030204" pitchFamily="34" charset="0"/>
-                <a:cs typeface="Times New Roman" panose="02020603050405020304" pitchFamily="18" charset="0"/>
-              </a:rPr>
-              <a:t>secure the root user by changing the password</a:t>
+              <a:t>Lists which files and folders won’t be copied/packed into the Docker image.</a:t>
             </a:r>
             <a:endParaRPr lang="fi-FI" dirty="0">
               <a:effectLst/>
@@ -6989,97 +6946,7 @@
             </a:endParaRPr>
           </a:p>
           <a:p>
-            <a:pPr marL="846900" lvl="1" indent="-342900">
-              <a:lnSpc>
-                <a:spcPct val="107000"/>
-              </a:lnSpc>
-              <a:buFont typeface="Calibri" panose="020F0502020204030204" pitchFamily="34" charset="0"/>
-              <a:buChar char="-"/>
-            </a:pPr>
-            <a:r>
-              <a:rPr lang="en-US" dirty="0">
-                <a:effectLst/>
-                <a:latin typeface="Calibri" panose="020F0502020204030204" pitchFamily="34" charset="0"/>
-                <a:ea typeface="Calibri" panose="020F0502020204030204" pitchFamily="34" charset="0"/>
-                <a:cs typeface="Times New Roman" panose="02020603050405020304" pitchFamily="18" charset="0"/>
-              </a:rPr>
-              <a:t>create a user with less privileges with safe password or other safe access. </a:t>
-            </a:r>
-            <a:endParaRPr lang="fi-FI" dirty="0">
-              <a:effectLst/>
-              <a:latin typeface="Calibri" panose="020F0502020204030204" pitchFamily="34" charset="0"/>
-              <a:ea typeface="Calibri" panose="020F0502020204030204" pitchFamily="34" charset="0"/>
-              <a:cs typeface="Times New Roman" panose="02020603050405020304" pitchFamily="18" charset="0"/>
-            </a:endParaRPr>
-          </a:p>
-          <a:p>
-            <a:pPr marL="846900" lvl="1" indent="-342900">
-              <a:lnSpc>
-                <a:spcPct val="107000"/>
-              </a:lnSpc>
-              <a:buFont typeface="Calibri" panose="020F0502020204030204" pitchFamily="34" charset="0"/>
-              <a:buChar char="-"/>
-            </a:pPr>
-            <a:r>
-              <a:rPr lang="en-US" dirty="0">
-                <a:effectLst/>
-                <a:latin typeface="Calibri" panose="020F0502020204030204" pitchFamily="34" charset="0"/>
-                <a:ea typeface="Calibri" panose="020F0502020204030204" pitchFamily="34" charset="0"/>
-                <a:cs typeface="Times New Roman" panose="02020603050405020304" pitchFamily="18" charset="0"/>
-              </a:rPr>
-              <a:t>give that user access to wanted schema etc.</a:t>
-            </a:r>
-            <a:endParaRPr lang="fi-FI" dirty="0">
-              <a:effectLst/>
-              <a:latin typeface="Calibri" panose="020F0502020204030204" pitchFamily="34" charset="0"/>
-              <a:ea typeface="Calibri" panose="020F0502020204030204" pitchFamily="34" charset="0"/>
-              <a:cs typeface="Times New Roman" panose="02020603050405020304" pitchFamily="18" charset="0"/>
-            </a:endParaRPr>
-          </a:p>
-          <a:p>
-            <a:pPr marL="846900" lvl="1" indent="-342900">
-              <a:lnSpc>
-                <a:spcPct val="107000"/>
-              </a:lnSpc>
-              <a:spcAft>
-                <a:spcPts val="800"/>
-              </a:spcAft>
-              <a:buFont typeface="Calibri" panose="020F0502020204030204" pitchFamily="34" charset="0"/>
-              <a:buChar char="-"/>
-            </a:pPr>
-            <a:r>
-              <a:rPr lang="en-US" dirty="0">
-                <a:effectLst/>
-                <a:latin typeface="Calibri" panose="020F0502020204030204" pitchFamily="34" charset="0"/>
-                <a:ea typeface="Calibri" panose="020F0502020204030204" pitchFamily="34" charset="0"/>
-                <a:cs typeface="Times New Roman" panose="02020603050405020304" pitchFamily="18" charset="0"/>
-              </a:rPr>
-              <a:t>continue possibly with table creation, </a:t>
-            </a:r>
-            <a:r>
-              <a:rPr lang="en-US" dirty="0" err="1">
-                <a:effectLst/>
-                <a:latin typeface="Calibri" panose="020F0502020204030204" pitchFamily="34" charset="0"/>
-                <a:ea typeface="Calibri" panose="020F0502020204030204" pitchFamily="34" charset="0"/>
-                <a:cs typeface="Times New Roman" panose="02020603050405020304" pitchFamily="18" charset="0"/>
-              </a:rPr>
-              <a:t>etc</a:t>
-            </a:r>
-            <a:r>
-              <a:rPr lang="en-US" dirty="0">
-                <a:effectLst/>
-                <a:latin typeface="Calibri" panose="020F0502020204030204" pitchFamily="34" charset="0"/>
-                <a:ea typeface="Calibri" panose="020F0502020204030204" pitchFamily="34" charset="0"/>
-                <a:cs typeface="Times New Roman" panose="02020603050405020304" pitchFamily="18" charset="0"/>
-              </a:rPr>
-              <a:t>…</a:t>
-            </a:r>
-            <a:endParaRPr lang="fi-FI" dirty="0">
-              <a:effectLst/>
-              <a:latin typeface="Calibri" panose="020F0502020204030204" pitchFamily="34" charset="0"/>
-              <a:ea typeface="Calibri" panose="020F0502020204030204" pitchFamily="34" charset="0"/>
-              <a:cs typeface="Times New Roman" panose="02020603050405020304" pitchFamily="18" charset="0"/>
-            </a:endParaRPr>
+            <a:endParaRPr lang="fi-FI" dirty="0"/>
           </a:p>
         </p:txBody>
       </p:sp>
@@ -7106,7 +6973,7 @@
           <a:p>
             <a:fld id="{202E1EC2-47B8-044B-A09E-6A63B4D80C87}" type="datetime1">
               <a:rPr lang="fi-FI" smtClean="0"/>
-              <a:t>25.1.2024</a:t>
+              <a:t>18.2.2024</a:t>
             </a:fld>
             <a:endParaRPr lang="en-GB"/>
           </a:p>
@@ -7169,7 +7036,7 @@
     </p:spTree>
     <p:extLst>
       <p:ext uri="{BB962C8B-B14F-4D97-AF65-F5344CB8AC3E}">
-        <p14:creationId xmlns:p14="http://schemas.microsoft.com/office/powerpoint/2010/main" val="1005799627"/>
+        <p14:creationId xmlns:p14="http://schemas.microsoft.com/office/powerpoint/2010/main" val="3023738396"/>
       </p:ext>
     </p:extLst>
   </p:cSld>
@@ -7218,34 +7085,9 @@
           <a:lstStyle/>
           <a:p>
             <a:r>
-              <a:rPr lang="fi-FI" dirty="0" err="1"/>
-              <a:t>Docker</a:t>
-            </a:r>
-            <a:r>
               <a:rPr lang="fi-FI" dirty="0"/>
-              <a:t> Image </a:t>
-            </a:r>
-            <a:r>
-              <a:rPr lang="fi-FI" dirty="0" err="1"/>
-              <a:t>registry</a:t>
-            </a:r>
-            <a:r>
-              <a:rPr lang="fi-FI" dirty="0"/>
-              <a:t>, e.g. </a:t>
-            </a:r>
-            <a:r>
-              <a:rPr lang="fi-FI" dirty="0" err="1"/>
-              <a:t>Docker</a:t>
-            </a:r>
-            <a:r>
-              <a:rPr lang="fi-FI" dirty="0"/>
-              <a:t> </a:t>
-            </a:r>
-            <a:r>
-              <a:rPr lang="fi-FI" dirty="0" err="1"/>
-              <a:t>Hub</a:t>
-            </a:r>
-            <a:endParaRPr lang="fi-FI" dirty="0"/>
+              <a:t>image</a:t>
+            </a:r>
           </a:p>
         </p:txBody>
       </p:sp>
@@ -7287,8 +7129,14 @@
                 <a:ea typeface="Calibri" panose="020F0502020204030204" pitchFamily="34" charset="0"/>
                 <a:cs typeface="Times New Roman" panose="02020603050405020304" pitchFamily="18" charset="0"/>
               </a:rPr>
-              <a:t>We can push = publish our images for others to use. </a:t>
-            </a:r>
+              <a:t>Ready-made from Docker Hub, OR one you have created. Template that can be used to create container.</a:t>
+            </a:r>
+            <a:endParaRPr lang="fi-FI" sz="1800" dirty="0">
+              <a:effectLst/>
+              <a:latin typeface="Calibri" panose="020F0502020204030204" pitchFamily="34" charset="0"/>
+              <a:ea typeface="Calibri" panose="020F0502020204030204" pitchFamily="34" charset="0"/>
+              <a:cs typeface="Times New Roman" panose="02020603050405020304" pitchFamily="18" charset="0"/>
+            </a:endParaRPr>
           </a:p>
           <a:p>
             <a:pPr>
@@ -7306,7 +7154,7 @@
                 <a:ea typeface="Calibri" panose="020F0502020204030204" pitchFamily="34" charset="0"/>
                 <a:cs typeface="Times New Roman" panose="02020603050405020304" pitchFamily="18" charset="0"/>
               </a:rPr>
-              <a:t>Or pull = download images to use ourselves.</a:t>
+              <a:t>E.g. some MariaDB image you want to take into use. It’s a snapshot of a running/runnable MariaDB or other DB server that starts from a certain documented state. Typically, there is a root user with known password (public information, everyone knows the password!), a certain database/schema created, like ‘test’. When taking that image into use, you must then immediately:</a:t>
             </a:r>
             <a:endParaRPr lang="fi-FI" sz="1800" dirty="0">
               <a:effectLst/>
@@ -7315,6 +7163,123 @@
               <a:cs typeface="Times New Roman" panose="02020603050405020304" pitchFamily="18" charset="0"/>
             </a:endParaRPr>
           </a:p>
+          <a:p>
+            <a:pPr marL="846900" lvl="1" indent="-342900">
+              <a:lnSpc>
+                <a:spcPct val="107000"/>
+              </a:lnSpc>
+              <a:buFont typeface="Calibri" panose="020F0502020204030204" pitchFamily="34" charset="0"/>
+              <a:buChar char="-"/>
+            </a:pPr>
+            <a:r>
+              <a:rPr lang="en-US" dirty="0">
+                <a:effectLst/>
+                <a:latin typeface="Calibri" panose="020F0502020204030204" pitchFamily="34" charset="0"/>
+                <a:ea typeface="Calibri" panose="020F0502020204030204" pitchFamily="34" charset="0"/>
+                <a:cs typeface="Times New Roman" panose="02020603050405020304" pitchFamily="18" charset="0"/>
+              </a:rPr>
+              <a:t>secure the root user by changing the password</a:t>
+            </a:r>
+            <a:endParaRPr lang="fi-FI" dirty="0">
+              <a:effectLst/>
+              <a:latin typeface="Calibri" panose="020F0502020204030204" pitchFamily="34" charset="0"/>
+              <a:ea typeface="Calibri" panose="020F0502020204030204" pitchFamily="34" charset="0"/>
+              <a:cs typeface="Times New Roman" panose="02020603050405020304" pitchFamily="18" charset="0"/>
+            </a:endParaRPr>
+          </a:p>
+          <a:p>
+            <a:pPr marL="846900" lvl="1" indent="-342900">
+              <a:lnSpc>
+                <a:spcPct val="107000"/>
+              </a:lnSpc>
+              <a:buFont typeface="Calibri" panose="020F0502020204030204" pitchFamily="34" charset="0"/>
+              <a:buChar char="-"/>
+            </a:pPr>
+            <a:r>
+              <a:rPr lang="en-US" dirty="0">
+                <a:effectLst/>
+                <a:latin typeface="Calibri" panose="020F0502020204030204" pitchFamily="34" charset="0"/>
+                <a:ea typeface="Calibri" panose="020F0502020204030204" pitchFamily="34" charset="0"/>
+                <a:cs typeface="Times New Roman" panose="02020603050405020304" pitchFamily="18" charset="0"/>
+              </a:rPr>
+              <a:t>create a user with less privileges with safe password or other safe access. </a:t>
+            </a:r>
+            <a:endParaRPr lang="fi-FI" dirty="0">
+              <a:effectLst/>
+              <a:latin typeface="Calibri" panose="020F0502020204030204" pitchFamily="34" charset="0"/>
+              <a:ea typeface="Calibri" panose="020F0502020204030204" pitchFamily="34" charset="0"/>
+              <a:cs typeface="Times New Roman" panose="02020603050405020304" pitchFamily="18" charset="0"/>
+            </a:endParaRPr>
+          </a:p>
+          <a:p>
+            <a:pPr marL="846900" lvl="1" indent="-342900">
+              <a:lnSpc>
+                <a:spcPct val="107000"/>
+              </a:lnSpc>
+              <a:buFont typeface="Calibri" panose="020F0502020204030204" pitchFamily="34" charset="0"/>
+              <a:buChar char="-"/>
+            </a:pPr>
+            <a:r>
+              <a:rPr lang="en-US" dirty="0">
+                <a:effectLst/>
+                <a:latin typeface="Calibri" panose="020F0502020204030204" pitchFamily="34" charset="0"/>
+                <a:ea typeface="Calibri" panose="020F0502020204030204" pitchFamily="34" charset="0"/>
+                <a:cs typeface="Times New Roman" panose="02020603050405020304" pitchFamily="18" charset="0"/>
+              </a:rPr>
+              <a:t>give that user access to wanted schema etc.</a:t>
+            </a:r>
+            <a:endParaRPr lang="fi-FI" dirty="0">
+              <a:effectLst/>
+              <a:latin typeface="Calibri" panose="020F0502020204030204" pitchFamily="34" charset="0"/>
+              <a:ea typeface="Calibri" panose="020F0502020204030204" pitchFamily="34" charset="0"/>
+              <a:cs typeface="Times New Roman" panose="02020603050405020304" pitchFamily="18" charset="0"/>
+            </a:endParaRPr>
+          </a:p>
+          <a:p>
+            <a:pPr marL="846900" lvl="1" indent="-342900">
+              <a:lnSpc>
+                <a:spcPct val="107000"/>
+              </a:lnSpc>
+              <a:spcAft>
+                <a:spcPts val="800"/>
+              </a:spcAft>
+              <a:buFont typeface="Calibri" panose="020F0502020204030204" pitchFamily="34" charset="0"/>
+              <a:buChar char="-"/>
+            </a:pPr>
+            <a:r>
+              <a:rPr lang="en-US" dirty="0">
+                <a:effectLst/>
+                <a:latin typeface="Calibri" panose="020F0502020204030204" pitchFamily="34" charset="0"/>
+                <a:ea typeface="Calibri" panose="020F0502020204030204" pitchFamily="34" charset="0"/>
+                <a:cs typeface="Times New Roman" panose="02020603050405020304" pitchFamily="18" charset="0"/>
+              </a:rPr>
+              <a:t>continue possibly with table creation, </a:t>
+            </a:r>
+            <a:r>
+              <a:rPr lang="en-US" dirty="0" err="1">
+                <a:effectLst/>
+                <a:latin typeface="Calibri" panose="020F0502020204030204" pitchFamily="34" charset="0"/>
+                <a:ea typeface="Calibri" panose="020F0502020204030204" pitchFamily="34" charset="0"/>
+                <a:cs typeface="Times New Roman" panose="02020603050405020304" pitchFamily="18" charset="0"/>
+              </a:rPr>
+              <a:t>etc</a:t>
+            </a:r>
+            <a:r>
+              <a:rPr lang="en-US" dirty="0">
+                <a:effectLst/>
+                <a:latin typeface="Calibri" panose="020F0502020204030204" pitchFamily="34" charset="0"/>
+                <a:ea typeface="Calibri" panose="020F0502020204030204" pitchFamily="34" charset="0"/>
+                <a:cs typeface="Times New Roman" panose="02020603050405020304" pitchFamily="18" charset="0"/>
+              </a:rPr>
+              <a:t>…</a:t>
+            </a:r>
+            <a:endParaRPr lang="fi-FI" dirty="0">
+              <a:effectLst/>
+              <a:latin typeface="Calibri" panose="020F0502020204030204" pitchFamily="34" charset="0"/>
+              <a:ea typeface="Calibri" panose="020F0502020204030204" pitchFamily="34" charset="0"/>
+              <a:cs typeface="Times New Roman" panose="02020603050405020304" pitchFamily="18" charset="0"/>
+            </a:endParaRPr>
+          </a:p>
         </p:txBody>
       </p:sp>
       <p:sp>
@@ -7340,7 +7305,7 @@
           <a:p>
             <a:fld id="{202E1EC2-47B8-044B-A09E-6A63B4D80C87}" type="datetime1">
               <a:rPr lang="fi-FI" smtClean="0"/>
-              <a:t>25.1.2024</a:t>
+              <a:t>18.2.2024</a:t>
             </a:fld>
             <a:endParaRPr lang="en-GB"/>
           </a:p>
@@ -7395,6 +7360,240 @@
             <a:fld id="{76BAB7ED-EDE9-4D4B-9A2D-30E18C47C16E}" type="slidenum">
               <a:rPr lang="en-GB" smtClean="0"/>
               <a:t>11</a:t>
+            </a:fld>
+            <a:endParaRPr lang="en-GB"/>
+          </a:p>
+        </p:txBody>
+      </p:sp>
+    </p:spTree>
+    <p:extLst>
+      <p:ext uri="{BB962C8B-B14F-4D97-AF65-F5344CB8AC3E}">
+        <p14:creationId xmlns:p14="http://schemas.microsoft.com/office/powerpoint/2010/main" val="1005799627"/>
+      </p:ext>
+    </p:extLst>
+  </p:cSld>
+  <p:clrMapOvr>
+    <a:masterClrMapping/>
+  </p:clrMapOvr>
+</p:sld>
+</file>
+
+<file path=ppt/slides/slide12.xml><?xml version="1.0" encoding="utf-8"?>
+<p:sld xmlns:a="http://schemas.openxmlformats.org/drawingml/2006/main" xmlns:r="http://schemas.openxmlformats.org/officeDocument/2006/relationships" xmlns:p="http://schemas.openxmlformats.org/presentationml/2006/main">
+  <p:cSld>
+    <p:spTree>
+      <p:nvGrpSpPr>
+        <p:cNvPr id="1" name=""/>
+        <p:cNvGrpSpPr/>
+        <p:nvPr/>
+      </p:nvGrpSpPr>
+      <p:grpSpPr>
+        <a:xfrm>
+          <a:off x="0" y="0"/>
+          <a:ext cx="0" cy="0"/>
+          <a:chOff x="0" y="0"/>
+          <a:chExt cx="0" cy="0"/>
+        </a:xfrm>
+      </p:grpSpPr>
+      <p:sp>
+        <p:nvSpPr>
+          <p:cNvPr id="8" name="Title 7">
+            <a:extLst>
+              <a:ext uri="{FF2B5EF4-FFF2-40B4-BE49-F238E27FC236}">
+                <a16:creationId xmlns:a16="http://schemas.microsoft.com/office/drawing/2014/main" id="{197044C3-CD23-D844-B780-26FABA91AD0F}"/>
+              </a:ext>
+            </a:extLst>
+          </p:cNvPr>
+          <p:cNvSpPr>
+            <a:spLocks noGrp="1"/>
+          </p:cNvSpPr>
+          <p:nvPr>
+            <p:ph type="title"/>
+          </p:nvPr>
+        </p:nvSpPr>
+        <p:spPr/>
+        <p:txBody>
+          <a:bodyPr/>
+          <a:lstStyle/>
+          <a:p>
+            <a:r>
+              <a:rPr lang="fi-FI" dirty="0" err="1"/>
+              <a:t>Docker</a:t>
+            </a:r>
+            <a:r>
+              <a:rPr lang="fi-FI" dirty="0"/>
+              <a:t> Image </a:t>
+            </a:r>
+            <a:r>
+              <a:rPr lang="fi-FI" dirty="0" err="1"/>
+              <a:t>registry</a:t>
+            </a:r>
+            <a:r>
+              <a:rPr lang="fi-FI" dirty="0"/>
+              <a:t>, e.g. </a:t>
+            </a:r>
+            <a:r>
+              <a:rPr lang="fi-FI" dirty="0" err="1"/>
+              <a:t>Docker</a:t>
+            </a:r>
+            <a:r>
+              <a:rPr lang="fi-FI" dirty="0"/>
+              <a:t> </a:t>
+            </a:r>
+            <a:r>
+              <a:rPr lang="fi-FI" dirty="0" err="1"/>
+              <a:t>Hub</a:t>
+            </a:r>
+            <a:endParaRPr lang="fi-FI" dirty="0"/>
+          </a:p>
+        </p:txBody>
+      </p:sp>
+      <p:sp>
+        <p:nvSpPr>
+          <p:cNvPr id="9" name="Content Placeholder 8">
+            <a:extLst>
+              <a:ext uri="{FF2B5EF4-FFF2-40B4-BE49-F238E27FC236}">
+                <a16:creationId xmlns:a16="http://schemas.microsoft.com/office/drawing/2014/main" id="{ACDE61D8-A75A-F94B-B57A-46F276C03311}"/>
+              </a:ext>
+            </a:extLst>
+          </p:cNvPr>
+          <p:cNvSpPr>
+            <a:spLocks noGrp="1"/>
+          </p:cNvSpPr>
+          <p:nvPr>
+            <p:ph sz="half" idx="2"/>
+          </p:nvPr>
+        </p:nvSpPr>
+        <p:spPr/>
+        <p:txBody>
+          <a:bodyPr>
+            <a:normAutofit/>
+          </a:bodyPr>
+          <a:lstStyle/>
+          <a:p>
+            <a:pPr>
+              <a:lnSpc>
+                <a:spcPct val="107000"/>
+              </a:lnSpc>
+              <a:spcAft>
+                <a:spcPts val="800"/>
+              </a:spcAft>
+            </a:pPr>
+            <a:r>
+              <a:rPr lang="en-US" sz="1800" dirty="0">
+                <a:effectLst/>
+                <a:latin typeface="Calibri" panose="020F0502020204030204" pitchFamily="34" charset="0"/>
+                <a:ea typeface="Calibri" panose="020F0502020204030204" pitchFamily="34" charset="0"/>
+                <a:cs typeface="Times New Roman" panose="02020603050405020304" pitchFamily="18" charset="0"/>
+              </a:rPr>
+              <a:t>We can push = publish our images for others to use. </a:t>
+            </a:r>
+          </a:p>
+          <a:p>
+            <a:pPr>
+              <a:lnSpc>
+                <a:spcPct val="107000"/>
+              </a:lnSpc>
+              <a:spcAft>
+                <a:spcPts val="800"/>
+              </a:spcAft>
+            </a:pPr>
+            <a:r>
+              <a:rPr lang="en-US" sz="1800" dirty="0">
+                <a:effectLst/>
+                <a:latin typeface="Calibri" panose="020F0502020204030204" pitchFamily="34" charset="0"/>
+                <a:ea typeface="Calibri" panose="020F0502020204030204" pitchFamily="34" charset="0"/>
+                <a:cs typeface="Times New Roman" panose="02020603050405020304" pitchFamily="18" charset="0"/>
+              </a:rPr>
+              <a:t>Or pull = download images to use ourselves.</a:t>
+            </a:r>
+            <a:endParaRPr lang="fi-FI" sz="1800" dirty="0">
+              <a:effectLst/>
+              <a:latin typeface="Calibri" panose="020F0502020204030204" pitchFamily="34" charset="0"/>
+              <a:ea typeface="Calibri" panose="020F0502020204030204" pitchFamily="34" charset="0"/>
+              <a:cs typeface="Times New Roman" panose="02020603050405020304" pitchFamily="18" charset="0"/>
+            </a:endParaRPr>
+          </a:p>
+        </p:txBody>
+      </p:sp>
+      <p:sp>
+        <p:nvSpPr>
+          <p:cNvPr id="5" name="Date Placeholder 4">
+            <a:extLst>
+              <a:ext uri="{FF2B5EF4-FFF2-40B4-BE49-F238E27FC236}">
+                <a16:creationId xmlns:a16="http://schemas.microsoft.com/office/drawing/2014/main" id="{976244E2-AA76-2742-B2EC-FEC79276155C}"/>
+              </a:ext>
+            </a:extLst>
+          </p:cNvPr>
+          <p:cNvSpPr>
+            <a:spLocks noGrp="1"/>
+          </p:cNvSpPr>
+          <p:nvPr>
+            <p:ph type="dt" sz="half" idx="10"/>
+          </p:nvPr>
+        </p:nvSpPr>
+        <p:spPr/>
+        <p:txBody>
+          <a:bodyPr/>
+          <a:lstStyle/>
+          <a:p>
+            <a:fld id="{202E1EC2-47B8-044B-A09E-6A63B4D80C87}" type="datetime1">
+              <a:rPr lang="fi-FI" smtClean="0"/>
+              <a:t>18.2.2024</a:t>
+            </a:fld>
+            <a:endParaRPr lang="en-GB"/>
+          </a:p>
+        </p:txBody>
+      </p:sp>
+      <p:sp>
+        <p:nvSpPr>
+          <p:cNvPr id="6" name="Footer Placeholder 5">
+            <a:extLst>
+              <a:ext uri="{FF2B5EF4-FFF2-40B4-BE49-F238E27FC236}">
+                <a16:creationId xmlns:a16="http://schemas.microsoft.com/office/drawing/2014/main" id="{588CE607-4137-8840-8FEA-42EAC857E3A3}"/>
+              </a:ext>
+            </a:extLst>
+          </p:cNvPr>
+          <p:cNvSpPr>
+            <a:spLocks noGrp="1"/>
+          </p:cNvSpPr>
+          <p:nvPr>
+            <p:ph type="ftr" sz="quarter" idx="11"/>
+          </p:nvPr>
+        </p:nvSpPr>
+        <p:spPr/>
+        <p:txBody>
+          <a:bodyPr/>
+          <a:lstStyle/>
+          <a:p>
+            <a:endParaRPr lang="en-GB"/>
+          </a:p>
+        </p:txBody>
+      </p:sp>
+      <p:sp>
+        <p:nvSpPr>
+          <p:cNvPr id="7" name="Slide Number Placeholder 6">
+            <a:extLst>
+              <a:ext uri="{FF2B5EF4-FFF2-40B4-BE49-F238E27FC236}">
+                <a16:creationId xmlns:a16="http://schemas.microsoft.com/office/drawing/2014/main" id="{2E133A96-6C73-0844-B8CB-27C2B5F4CFB1}"/>
+              </a:ext>
+            </a:extLst>
+          </p:cNvPr>
+          <p:cNvSpPr>
+            <a:spLocks noGrp="1"/>
+          </p:cNvSpPr>
+          <p:nvPr>
+            <p:ph type="sldNum" sz="quarter" idx="12"/>
+          </p:nvPr>
+        </p:nvSpPr>
+        <p:spPr/>
+        <p:txBody>
+          <a:bodyPr/>
+          <a:lstStyle/>
+          <a:p>
+            <a:fld id="{76BAB7ED-EDE9-4D4B-9A2D-30E18C47C16E}" type="slidenum">
+              <a:rPr lang="en-GB" smtClean="0"/>
+              <a:t>12</a:t>
             </a:fld>
             <a:endParaRPr lang="en-GB"/>
           </a:p>
@@ -7443,362 +7642,6 @@
 </p:sld>
 </file>
 
-<file path=ppt/slides/slide12.xml><?xml version="1.0" encoding="utf-8"?>
-<p:sld xmlns:a="http://schemas.openxmlformats.org/drawingml/2006/main" xmlns:r="http://schemas.openxmlformats.org/officeDocument/2006/relationships" xmlns:p="http://schemas.openxmlformats.org/presentationml/2006/main">
-  <p:cSld>
-    <p:spTree>
-      <p:nvGrpSpPr>
-        <p:cNvPr id="1" name=""/>
-        <p:cNvGrpSpPr/>
-        <p:nvPr/>
-      </p:nvGrpSpPr>
-      <p:grpSpPr>
-        <a:xfrm>
-          <a:off x="0" y="0"/>
-          <a:ext cx="0" cy="0"/>
-          <a:chOff x="0" y="0"/>
-          <a:chExt cx="0" cy="0"/>
-        </a:xfrm>
-      </p:grpSpPr>
-      <p:sp>
-        <p:nvSpPr>
-          <p:cNvPr id="8" name="Title 7">
-            <a:extLst>
-              <a:ext uri="{FF2B5EF4-FFF2-40B4-BE49-F238E27FC236}">
-                <a16:creationId xmlns:a16="http://schemas.microsoft.com/office/drawing/2014/main" id="{197044C3-CD23-D844-B780-26FABA91AD0F}"/>
-              </a:ext>
-            </a:extLst>
-          </p:cNvPr>
-          <p:cNvSpPr>
-            <a:spLocks noGrp="1"/>
-          </p:cNvSpPr>
-          <p:nvPr>
-            <p:ph type="title"/>
-          </p:nvPr>
-        </p:nvSpPr>
-        <p:spPr/>
-        <p:txBody>
-          <a:bodyPr/>
-          <a:lstStyle/>
-          <a:p>
-            <a:r>
-              <a:rPr lang="fi-FI" dirty="0" err="1"/>
-              <a:t>docker</a:t>
-            </a:r>
-            <a:r>
-              <a:rPr lang="fi-FI" dirty="0"/>
-              <a:t> </a:t>
-            </a:r>
-            <a:r>
-              <a:rPr lang="fi-FI" dirty="0" err="1"/>
-              <a:t>compose</a:t>
-            </a:r>
-            <a:endParaRPr lang="fi-FI" dirty="0"/>
-          </a:p>
-        </p:txBody>
-      </p:sp>
-      <p:sp>
-        <p:nvSpPr>
-          <p:cNvPr id="9" name="Content Placeholder 8">
-            <a:extLst>
-              <a:ext uri="{FF2B5EF4-FFF2-40B4-BE49-F238E27FC236}">
-                <a16:creationId xmlns:a16="http://schemas.microsoft.com/office/drawing/2014/main" id="{ACDE61D8-A75A-F94B-B57A-46F276C03311}"/>
-              </a:ext>
-            </a:extLst>
-          </p:cNvPr>
-          <p:cNvSpPr>
-            <a:spLocks noGrp="1"/>
-          </p:cNvSpPr>
-          <p:nvPr>
-            <p:ph sz="half" idx="2"/>
-          </p:nvPr>
-        </p:nvSpPr>
-        <p:spPr/>
-        <p:txBody>
-          <a:bodyPr>
-            <a:normAutofit/>
-          </a:bodyPr>
-          <a:lstStyle/>
-          <a:p>
-            <a:pPr>
-              <a:lnSpc>
-                <a:spcPct val="107000"/>
-              </a:lnSpc>
-              <a:spcAft>
-                <a:spcPts val="800"/>
-              </a:spcAft>
-            </a:pPr>
-            <a:r>
-              <a:rPr lang="en-US" dirty="0">
-                <a:effectLst/>
-                <a:latin typeface="Calibri" panose="020F0502020204030204" pitchFamily="34" charset="0"/>
-                <a:ea typeface="Calibri" panose="020F0502020204030204" pitchFamily="34" charset="0"/>
-                <a:cs typeface="Times New Roman" panose="02020603050405020304" pitchFamily="18" charset="0"/>
-              </a:rPr>
-              <a:t>Tool for creating and starting multiple containers that depend on / talk to each other. </a:t>
-            </a:r>
-          </a:p>
-          <a:p>
-            <a:pPr>
-              <a:lnSpc>
-                <a:spcPct val="107000"/>
-              </a:lnSpc>
-              <a:spcAft>
-                <a:spcPts val="800"/>
-              </a:spcAft>
-            </a:pPr>
-            <a:r>
-              <a:rPr lang="en-US" dirty="0">
-                <a:effectLst/>
-                <a:latin typeface="Calibri" panose="020F0502020204030204" pitchFamily="34" charset="0"/>
-                <a:ea typeface="Calibri" panose="020F0502020204030204" pitchFamily="34" charset="0"/>
-                <a:cs typeface="Times New Roman" panose="02020603050405020304" pitchFamily="18" charset="0"/>
-              </a:rPr>
-              <a:t>Thus, you’ll have to:</a:t>
-            </a:r>
-          </a:p>
-          <a:p>
-            <a:pPr lvl="1">
-              <a:lnSpc>
-                <a:spcPct val="107000"/>
-              </a:lnSpc>
-              <a:spcAft>
-                <a:spcPts val="800"/>
-              </a:spcAft>
-            </a:pPr>
-            <a:r>
-              <a:rPr lang="en-US" sz="1800" dirty="0">
-                <a:effectLst/>
-                <a:latin typeface="Calibri" panose="020F0502020204030204" pitchFamily="34" charset="0"/>
-                <a:ea typeface="Calibri" panose="020F0502020204030204" pitchFamily="34" charset="0"/>
-                <a:cs typeface="Times New Roman" panose="02020603050405020304" pitchFamily="18" charset="0"/>
-              </a:rPr>
-              <a:t>make some ports exposed </a:t>
-            </a:r>
-          </a:p>
-          <a:p>
-            <a:pPr lvl="1">
-              <a:lnSpc>
-                <a:spcPct val="107000"/>
-              </a:lnSpc>
-              <a:spcAft>
-                <a:spcPts val="800"/>
-              </a:spcAft>
-            </a:pPr>
-            <a:r>
-              <a:rPr lang="en-US" sz="1800" dirty="0">
-                <a:latin typeface="Calibri" panose="020F0502020204030204" pitchFamily="34" charset="0"/>
-                <a:ea typeface="Calibri" panose="020F0502020204030204" pitchFamily="34" charset="0"/>
-                <a:cs typeface="Times New Roman" panose="02020603050405020304" pitchFamily="18" charset="0"/>
-              </a:rPr>
-              <a:t>a</a:t>
-            </a:r>
-            <a:r>
-              <a:rPr lang="en-US" sz="1800" dirty="0">
-                <a:effectLst/>
-                <a:latin typeface="Calibri" panose="020F0502020204030204" pitchFamily="34" charset="0"/>
-                <a:ea typeface="Calibri" panose="020F0502020204030204" pitchFamily="34" charset="0"/>
-                <a:cs typeface="Times New Roman" panose="02020603050405020304" pitchFamily="18" charset="0"/>
-              </a:rPr>
-              <a:t>nd/or define (virtual) networks shared by multiple containers </a:t>
-            </a:r>
-          </a:p>
-          <a:p>
-            <a:pPr lvl="1">
-              <a:lnSpc>
-                <a:spcPct val="107000"/>
-              </a:lnSpc>
-              <a:spcAft>
-                <a:spcPts val="800"/>
-              </a:spcAft>
-            </a:pPr>
-            <a:r>
-              <a:rPr lang="en-US" sz="1800" dirty="0">
-                <a:effectLst/>
-                <a:latin typeface="Calibri" panose="020F0502020204030204" pitchFamily="34" charset="0"/>
-                <a:ea typeface="Calibri" panose="020F0502020204030204" pitchFamily="34" charset="0"/>
-                <a:cs typeface="Times New Roman" panose="02020603050405020304" pitchFamily="18" charset="0"/>
-              </a:rPr>
-              <a:t>or share volumes. </a:t>
-            </a:r>
-            <a:endParaRPr lang="en-US" sz="1800" dirty="0">
-              <a:latin typeface="Calibri" panose="020F0502020204030204" pitchFamily="34" charset="0"/>
-              <a:ea typeface="Calibri" panose="020F0502020204030204" pitchFamily="34" charset="0"/>
-              <a:cs typeface="Times New Roman" panose="02020603050405020304" pitchFamily="18" charset="0"/>
-            </a:endParaRPr>
-          </a:p>
-          <a:p>
-            <a:pPr>
-              <a:lnSpc>
-                <a:spcPct val="107000"/>
-              </a:lnSpc>
-              <a:spcAft>
-                <a:spcPts val="800"/>
-              </a:spcAft>
-            </a:pPr>
-            <a:r>
-              <a:rPr lang="en-US" dirty="0">
-                <a:effectLst/>
-                <a:latin typeface="Calibri" panose="020F0502020204030204" pitchFamily="34" charset="0"/>
-                <a:ea typeface="Calibri" panose="020F0502020204030204" pitchFamily="34" charset="0"/>
-                <a:cs typeface="Times New Roman" panose="02020603050405020304" pitchFamily="18" charset="0"/>
-              </a:rPr>
-              <a:t>You can define those in a docker-</a:t>
-            </a:r>
-            <a:r>
-              <a:rPr lang="en-US" dirty="0" err="1">
-                <a:effectLst/>
-                <a:latin typeface="Calibri" panose="020F0502020204030204" pitchFamily="34" charset="0"/>
-                <a:ea typeface="Calibri" panose="020F0502020204030204" pitchFamily="34" charset="0"/>
-                <a:cs typeface="Times New Roman" panose="02020603050405020304" pitchFamily="18" charset="0"/>
-              </a:rPr>
-              <a:t>compose.yml</a:t>
-            </a:r>
-            <a:r>
-              <a:rPr lang="en-US" dirty="0">
-                <a:effectLst/>
-                <a:latin typeface="Calibri" panose="020F0502020204030204" pitchFamily="34" charset="0"/>
-                <a:ea typeface="Calibri" panose="020F0502020204030204" pitchFamily="34" charset="0"/>
-                <a:cs typeface="Times New Roman" panose="02020603050405020304" pitchFamily="18" charset="0"/>
-              </a:rPr>
-              <a:t> file</a:t>
-            </a:r>
-          </a:p>
-          <a:p>
-            <a:pPr>
-              <a:lnSpc>
-                <a:spcPct val="107000"/>
-              </a:lnSpc>
-              <a:spcAft>
-                <a:spcPts val="800"/>
-              </a:spcAft>
-            </a:pPr>
-            <a:r>
-              <a:rPr lang="fi-FI" dirty="0">
-                <a:effectLst/>
-                <a:latin typeface="Calibri" panose="020F0502020204030204" pitchFamily="34" charset="0"/>
-                <a:ea typeface="Calibri" panose="020F0502020204030204" pitchFamily="34" charset="0"/>
-                <a:cs typeface="Times New Roman" panose="02020603050405020304" pitchFamily="18" charset="0"/>
-                <a:hlinkClick r:id="rId2"/>
-              </a:rPr>
-              <a:t>https://docs.docker.com/compose/compose-application-model/</a:t>
-            </a:r>
-            <a:r>
-              <a:rPr lang="en-US" dirty="0">
-                <a:latin typeface="Calibri" panose="020F0502020204030204" pitchFamily="34" charset="0"/>
-                <a:ea typeface="Calibri" panose="020F0502020204030204" pitchFamily="34" charset="0"/>
-                <a:cs typeface="Times New Roman" panose="02020603050405020304" pitchFamily="18" charset="0"/>
-              </a:rPr>
-              <a:t> </a:t>
-            </a:r>
-            <a:endParaRPr lang="fi-FI" dirty="0">
-              <a:effectLst/>
-              <a:latin typeface="Calibri" panose="020F0502020204030204" pitchFamily="34" charset="0"/>
-              <a:ea typeface="Calibri" panose="020F0502020204030204" pitchFamily="34" charset="0"/>
-              <a:cs typeface="Times New Roman" panose="02020603050405020304" pitchFamily="18" charset="0"/>
-            </a:endParaRPr>
-          </a:p>
-          <a:p>
-            <a:endParaRPr lang="fi-FI" dirty="0"/>
-          </a:p>
-        </p:txBody>
-      </p:sp>
-      <p:sp>
-        <p:nvSpPr>
-          <p:cNvPr id="5" name="Date Placeholder 4">
-            <a:extLst>
-              <a:ext uri="{FF2B5EF4-FFF2-40B4-BE49-F238E27FC236}">
-                <a16:creationId xmlns:a16="http://schemas.microsoft.com/office/drawing/2014/main" id="{976244E2-AA76-2742-B2EC-FEC79276155C}"/>
-              </a:ext>
-            </a:extLst>
-          </p:cNvPr>
-          <p:cNvSpPr>
-            <a:spLocks noGrp="1"/>
-          </p:cNvSpPr>
-          <p:nvPr>
-            <p:ph type="dt" sz="half" idx="10"/>
-          </p:nvPr>
-        </p:nvSpPr>
-        <p:spPr/>
-        <p:txBody>
-          <a:bodyPr/>
-          <a:lstStyle/>
-          <a:p>
-            <a:fld id="{202E1EC2-47B8-044B-A09E-6A63B4D80C87}" type="datetime1">
-              <a:rPr lang="fi-FI" smtClean="0"/>
-              <a:t>25.1.2024</a:t>
-            </a:fld>
-            <a:endParaRPr lang="en-GB"/>
-          </a:p>
-        </p:txBody>
-      </p:sp>
-      <p:sp>
-        <p:nvSpPr>
-          <p:cNvPr id="6" name="Footer Placeholder 5">
-            <a:extLst>
-              <a:ext uri="{FF2B5EF4-FFF2-40B4-BE49-F238E27FC236}">
-                <a16:creationId xmlns:a16="http://schemas.microsoft.com/office/drawing/2014/main" id="{588CE607-4137-8840-8FEA-42EAC857E3A3}"/>
-              </a:ext>
-            </a:extLst>
-          </p:cNvPr>
-          <p:cNvSpPr>
-            <a:spLocks noGrp="1"/>
-          </p:cNvSpPr>
-          <p:nvPr>
-            <p:ph type="ftr" sz="quarter" idx="11"/>
-          </p:nvPr>
-        </p:nvSpPr>
-        <p:spPr/>
-        <p:txBody>
-          <a:bodyPr/>
-          <a:lstStyle/>
-          <a:p>
-            <a:endParaRPr lang="en-GB"/>
-          </a:p>
-        </p:txBody>
-      </p:sp>
-      <p:sp>
-        <p:nvSpPr>
-          <p:cNvPr id="7" name="Slide Number Placeholder 6">
-            <a:extLst>
-              <a:ext uri="{FF2B5EF4-FFF2-40B4-BE49-F238E27FC236}">
-                <a16:creationId xmlns:a16="http://schemas.microsoft.com/office/drawing/2014/main" id="{2E133A96-6C73-0844-B8CB-27C2B5F4CFB1}"/>
-              </a:ext>
-            </a:extLst>
-          </p:cNvPr>
-          <p:cNvSpPr>
-            <a:spLocks noGrp="1"/>
-          </p:cNvSpPr>
-          <p:nvPr>
-            <p:ph type="sldNum" sz="quarter" idx="12"/>
-          </p:nvPr>
-        </p:nvSpPr>
-        <p:spPr/>
-        <p:txBody>
-          <a:bodyPr/>
-          <a:lstStyle/>
-          <a:p>
-            <a:fld id="{76BAB7ED-EDE9-4D4B-9A2D-30E18C47C16E}" type="slidenum">
-              <a:rPr lang="en-GB" smtClean="0"/>
-              <a:t>12</a:t>
-            </a:fld>
-            <a:endParaRPr lang="en-GB"/>
-          </a:p>
-        </p:txBody>
-      </p:sp>
-    </p:spTree>
-    <p:extLst>
-      <p:ext uri="{BB962C8B-B14F-4D97-AF65-F5344CB8AC3E}">
-        <p14:creationId xmlns:p14="http://schemas.microsoft.com/office/powerpoint/2010/main" val="516399923"/>
-      </p:ext>
-    </p:extLst>
-  </p:cSld>
-  <p:clrMapOvr>
-    <a:masterClrMapping/>
-  </p:clrMapOvr>
-</p:sld>
-</file>
-
 <file path=ppt/slides/slide13.xml><?xml version="1.0" encoding="utf-8"?>
 <p:sld xmlns:a="http://schemas.openxmlformats.org/drawingml/2006/main" xmlns:r="http://schemas.openxmlformats.org/officeDocument/2006/relationships" xmlns:p="http://schemas.openxmlformats.org/presentationml/2006/main">
   <p:cSld>
@@ -7839,7 +7682,15 @@
           <a:p>
             <a:r>
               <a:rPr lang="fi-FI" dirty="0" err="1"/>
-              <a:t>volume</a:t>
+              <a:t>docker</a:t>
+            </a:r>
+            <a:r>
+              <a:rPr lang="fi-FI" dirty="0"/>
+              <a:t> </a:t>
+            </a:r>
+            <a:r>
+              <a:rPr lang="fi-FI" dirty="0" err="1"/>
+              <a:t>compose</a:t>
             </a:r>
             <a:endParaRPr lang="fi-FI" dirty="0"/>
           </a:p>
@@ -7877,13 +7728,13 @@
               </a:spcAft>
             </a:pPr>
             <a:r>
-              <a:rPr lang="en-US" sz="1800" dirty="0">
+              <a:rPr lang="en-US" dirty="0">
                 <a:effectLst/>
                 <a:latin typeface="Calibri" panose="020F0502020204030204" pitchFamily="34" charset="0"/>
                 <a:ea typeface="Calibri" panose="020F0502020204030204" pitchFamily="34" charset="0"/>
                 <a:cs typeface="Times New Roman" panose="02020603050405020304" pitchFamily="18" charset="0"/>
               </a:rPr>
-              <a:t>Persisted folders and files on disk. </a:t>
+              <a:t>Tool for creating and starting multiple containers that depend on / talk to each other. </a:t>
             </a:r>
           </a:p>
           <a:p>
@@ -7896,14 +7747,103 @@
               </a:spcAft>
             </a:pPr>
             <a:r>
+              <a:rPr lang="en-US" dirty="0">
+                <a:effectLst/>
+                <a:latin typeface="Calibri" panose="020F0502020204030204" pitchFamily="34" charset="0"/>
+                <a:ea typeface="Calibri" panose="020F0502020204030204" pitchFamily="34" charset="0"/>
+                <a:cs typeface="Times New Roman" panose="02020603050405020304" pitchFamily="18" charset="0"/>
+              </a:rPr>
+              <a:t>Thus, you’ll have to:</a:t>
+            </a:r>
+          </a:p>
+          <a:p>
+            <a:pPr lvl="1">
+              <a:lnSpc>
+                <a:spcPct val="107000"/>
+              </a:lnSpc>
+              <a:spcAft>
+                <a:spcPts val="800"/>
+              </a:spcAft>
+            </a:pPr>
+            <a:r>
               <a:rPr lang="en-US" sz="1800" dirty="0">
                 <a:effectLst/>
                 <a:latin typeface="Calibri" panose="020F0502020204030204" pitchFamily="34" charset="0"/>
                 <a:ea typeface="Calibri" panose="020F0502020204030204" pitchFamily="34" charset="0"/>
                 <a:cs typeface="Times New Roman" panose="02020603050405020304" pitchFamily="18" charset="0"/>
               </a:rPr>
-              <a:t>Allows sharing between containers</a:t>
-            </a:r>
+              <a:t>define the services, plus</a:t>
+            </a:r>
+          </a:p>
+          <a:p>
+            <a:pPr lvl="2">
+              <a:lnSpc>
+                <a:spcPct val="107000"/>
+              </a:lnSpc>
+              <a:spcAft>
+                <a:spcPts val="800"/>
+              </a:spcAft>
+            </a:pPr>
+            <a:r>
+              <a:rPr lang="en-US" sz="1800" dirty="0">
+                <a:effectLst/>
+                <a:latin typeface="Calibri" panose="020F0502020204030204" pitchFamily="34" charset="0"/>
+                <a:ea typeface="Calibri" panose="020F0502020204030204" pitchFamily="34" charset="0"/>
+                <a:cs typeface="Times New Roman" panose="02020603050405020304" pitchFamily="18" charset="0"/>
+              </a:rPr>
+              <a:t>make some ports exposed </a:t>
+            </a:r>
+          </a:p>
+          <a:p>
+            <a:pPr lvl="2">
+              <a:lnSpc>
+                <a:spcPct val="107000"/>
+              </a:lnSpc>
+              <a:spcAft>
+                <a:spcPts val="800"/>
+              </a:spcAft>
+            </a:pPr>
+            <a:r>
+              <a:rPr lang="en-US" sz="1800" dirty="0">
+                <a:latin typeface="Calibri" panose="020F0502020204030204" pitchFamily="34" charset="0"/>
+                <a:ea typeface="Calibri" panose="020F0502020204030204" pitchFamily="34" charset="0"/>
+                <a:cs typeface="Times New Roman" panose="02020603050405020304" pitchFamily="18" charset="0"/>
+              </a:rPr>
+              <a:t>a</a:t>
+            </a:r>
+            <a:r>
+              <a:rPr lang="en-US" sz="1800" dirty="0">
+                <a:effectLst/>
+                <a:latin typeface="Calibri" panose="020F0502020204030204" pitchFamily="34" charset="0"/>
+                <a:ea typeface="Calibri" panose="020F0502020204030204" pitchFamily="34" charset="0"/>
+                <a:cs typeface="Times New Roman" panose="02020603050405020304" pitchFamily="18" charset="0"/>
+              </a:rPr>
+              <a:t>nd/or define (virtual) networks shared by multiple containers </a:t>
+            </a:r>
+          </a:p>
+          <a:p>
+            <a:pPr lvl="2">
+              <a:lnSpc>
+                <a:spcPct val="107000"/>
+              </a:lnSpc>
+              <a:spcAft>
+                <a:spcPts val="800"/>
+              </a:spcAft>
+            </a:pPr>
+            <a:r>
+              <a:rPr lang="en-US" sz="1800" dirty="0">
+                <a:effectLst/>
+                <a:latin typeface="Calibri" panose="020F0502020204030204" pitchFamily="34" charset="0"/>
+                <a:ea typeface="Calibri" panose="020F0502020204030204" pitchFamily="34" charset="0"/>
+                <a:cs typeface="Times New Roman" panose="02020603050405020304" pitchFamily="18" charset="0"/>
+              </a:rPr>
+              <a:t>or share volumes. </a:t>
+            </a:r>
+            <a:endParaRPr lang="en-US" sz="1800" dirty="0">
+              <a:latin typeface="Calibri" panose="020F0502020204030204" pitchFamily="34" charset="0"/>
+              <a:ea typeface="Calibri" panose="020F0502020204030204" pitchFamily="34" charset="0"/>
+              <a:cs typeface="Times New Roman" panose="02020603050405020304" pitchFamily="18" charset="0"/>
+            </a:endParaRPr>
           </a:p>
           <a:p>
             <a:pPr>
@@ -7915,15 +7855,61 @@
               </a:spcAft>
             </a:pPr>
             <a:r>
-              <a:rPr lang="en-US" sz="1800" dirty="0">
+              <a:rPr lang="en-US" dirty="0">
                 <a:effectLst/>
                 <a:latin typeface="Calibri" panose="020F0502020204030204" pitchFamily="34" charset="0"/>
                 <a:ea typeface="Calibri" panose="020F0502020204030204" pitchFamily="34" charset="0"/>
                 <a:cs typeface="Times New Roman" panose="02020603050405020304" pitchFamily="18" charset="0"/>
               </a:rPr>
-              <a:t>Also for keeping data between container deletion and re-creation! (Container is deleted totally, but volume resides by default in the host file system)</a:t>
-            </a:r>
-            <a:endParaRPr lang="fi-FI" sz="1800" dirty="0">
+              <a:t>You can define those in a docker-</a:t>
+            </a:r>
+            <a:r>
+              <a:rPr lang="en-US" dirty="0" err="1">
+                <a:effectLst/>
+                <a:latin typeface="Calibri" panose="020F0502020204030204" pitchFamily="34" charset="0"/>
+                <a:ea typeface="Calibri" panose="020F0502020204030204" pitchFamily="34" charset="0"/>
+                <a:cs typeface="Times New Roman" panose="02020603050405020304" pitchFamily="18" charset="0"/>
+              </a:rPr>
+              <a:t>compose.yml</a:t>
+            </a:r>
+            <a:r>
+              <a:rPr lang="en-US" dirty="0">
+                <a:effectLst/>
+                <a:latin typeface="Calibri" panose="020F0502020204030204" pitchFamily="34" charset="0"/>
+                <a:ea typeface="Calibri" panose="020F0502020204030204" pitchFamily="34" charset="0"/>
+                <a:cs typeface="Times New Roman" panose="02020603050405020304" pitchFamily="18" charset="0"/>
+              </a:rPr>
+              <a:t> file</a:t>
+            </a:r>
+          </a:p>
+          <a:p>
+            <a:pPr>
+              <a:lnSpc>
+                <a:spcPct val="107000"/>
+              </a:lnSpc>
+              <a:spcAft>
+                <a:spcPts val="800"/>
+              </a:spcAft>
+            </a:pPr>
+            <a:r>
+              <a:rPr lang="fi-FI" dirty="0">
+                <a:effectLst/>
+                <a:latin typeface="Calibri" panose="020F0502020204030204" pitchFamily="34" charset="0"/>
+                <a:ea typeface="Calibri" panose="020F0502020204030204" pitchFamily="34" charset="0"/>
+                <a:cs typeface="Times New Roman" panose="02020603050405020304" pitchFamily="18" charset="0"/>
+                <a:hlinkClick r:id="rId2"/>
+              </a:rPr>
+              <a:t>https://docs.docker.com/compose/compose-application-model/</a:t>
+            </a:r>
+            <a:r>
+              <a:rPr lang="en-US" dirty="0">
+                <a:latin typeface="Calibri" panose="020F0502020204030204" pitchFamily="34" charset="0"/>
+                <a:ea typeface="Calibri" panose="020F0502020204030204" pitchFamily="34" charset="0"/>
+                <a:cs typeface="Times New Roman" panose="02020603050405020304" pitchFamily="18" charset="0"/>
+              </a:rPr>
+              <a:t> </a:t>
+            </a:r>
+            <a:endParaRPr lang="fi-FI" dirty="0">
               <a:effectLst/>
               <a:latin typeface="Calibri" panose="020F0502020204030204" pitchFamily="34" charset="0"/>
               <a:ea typeface="Calibri" panose="020F0502020204030204" pitchFamily="34" charset="0"/>
@@ -7958,7 +7944,7 @@
           <a:p>
             <a:fld id="{202E1EC2-47B8-044B-A09E-6A63B4D80C87}" type="datetime1">
               <a:rPr lang="fi-FI" smtClean="0"/>
-              <a:t>25.1.2024</a:t>
+              <a:t>18.2.2024</a:t>
             </a:fld>
             <a:endParaRPr lang="en-GB"/>
           </a:p>
@@ -8021,7 +8007,7 @@
     </p:spTree>
     <p:extLst>
       <p:ext uri="{BB962C8B-B14F-4D97-AF65-F5344CB8AC3E}">
-        <p14:creationId xmlns:p14="http://schemas.microsoft.com/office/powerpoint/2010/main" val="1194808136"/>
+        <p14:creationId xmlns:p14="http://schemas.microsoft.com/office/powerpoint/2010/main" val="516399923"/>
       </p:ext>
     </p:extLst>
   </p:cSld>
@@ -8079,144 +8065,35 @@
       </p:sp>
       <p:sp>
         <p:nvSpPr>
-          <p:cNvPr id="5" name="Date Placeholder 4">
-            <a:extLst>
-              <a:ext uri="{FF2B5EF4-FFF2-40B4-BE49-F238E27FC236}">
-                <a16:creationId xmlns:a16="http://schemas.microsoft.com/office/drawing/2014/main" id="{976244E2-AA76-2742-B2EC-FEC79276155C}"/>
-              </a:ext>
-            </a:extLst>
-          </p:cNvPr>
-          <p:cNvSpPr>
-            <a:spLocks noGrp="1"/>
-          </p:cNvSpPr>
-          <p:nvPr>
-            <p:ph type="dt" sz="half" idx="10"/>
+          <p:cNvPr id="9" name="Content Placeholder 8">
+            <a:extLst>
+              <a:ext uri="{FF2B5EF4-FFF2-40B4-BE49-F238E27FC236}">
+                <a16:creationId xmlns:a16="http://schemas.microsoft.com/office/drawing/2014/main" id="{ACDE61D8-A75A-F94B-B57A-46F276C03311}"/>
+              </a:ext>
+            </a:extLst>
+          </p:cNvPr>
+          <p:cNvSpPr>
+            <a:spLocks noGrp="1"/>
+          </p:cNvSpPr>
+          <p:nvPr>
+            <p:ph sz="half" idx="2"/>
           </p:nvPr>
         </p:nvSpPr>
         <p:spPr/>
         <p:txBody>
-          <a:bodyPr/>
-          <a:lstStyle/>
-          <a:p>
-            <a:fld id="{202E1EC2-47B8-044B-A09E-6A63B4D80C87}" type="datetime1">
-              <a:rPr lang="fi-FI" smtClean="0"/>
-              <a:t>25.1.2024</a:t>
-            </a:fld>
-            <a:endParaRPr lang="en-GB"/>
-          </a:p>
-        </p:txBody>
-      </p:sp>
-      <p:sp>
-        <p:nvSpPr>
-          <p:cNvPr id="6" name="Footer Placeholder 5">
-            <a:extLst>
-              <a:ext uri="{FF2B5EF4-FFF2-40B4-BE49-F238E27FC236}">
-                <a16:creationId xmlns:a16="http://schemas.microsoft.com/office/drawing/2014/main" id="{588CE607-4137-8840-8FEA-42EAC857E3A3}"/>
-              </a:ext>
-            </a:extLst>
-          </p:cNvPr>
-          <p:cNvSpPr>
-            <a:spLocks noGrp="1"/>
-          </p:cNvSpPr>
-          <p:nvPr>
-            <p:ph type="ftr" sz="quarter" idx="11"/>
-          </p:nvPr>
-        </p:nvSpPr>
-        <p:spPr/>
-        <p:txBody>
-          <a:bodyPr/>
-          <a:lstStyle/>
-          <a:p>
-            <a:endParaRPr lang="en-GB"/>
-          </a:p>
-        </p:txBody>
-      </p:sp>
-      <p:sp>
-        <p:nvSpPr>
-          <p:cNvPr id="7" name="Slide Number Placeholder 6">
-            <a:extLst>
-              <a:ext uri="{FF2B5EF4-FFF2-40B4-BE49-F238E27FC236}">
-                <a16:creationId xmlns:a16="http://schemas.microsoft.com/office/drawing/2014/main" id="{2E133A96-6C73-0844-B8CB-27C2B5F4CFB1}"/>
-              </a:ext>
-            </a:extLst>
-          </p:cNvPr>
-          <p:cNvSpPr>
-            <a:spLocks noGrp="1"/>
-          </p:cNvSpPr>
-          <p:nvPr>
-            <p:ph type="sldNum" sz="quarter" idx="12"/>
-          </p:nvPr>
-        </p:nvSpPr>
-        <p:spPr/>
-        <p:txBody>
-          <a:bodyPr/>
-          <a:lstStyle/>
-          <a:p>
-            <a:fld id="{76BAB7ED-EDE9-4D4B-9A2D-30E18C47C16E}" type="slidenum">
-              <a:rPr lang="en-GB" smtClean="0"/>
-              <a:t>14</a:t>
-            </a:fld>
-            <a:endParaRPr lang="en-GB"/>
-          </a:p>
-        </p:txBody>
-      </p:sp>
-      <p:pic>
-        <p:nvPicPr>
-          <p:cNvPr id="10" name="Content Placeholder 9" descr="A diagram of a computer system&#10;&#10;Description automatically generated">
-            <a:extLst>
-              <a:ext uri="{FF2B5EF4-FFF2-40B4-BE49-F238E27FC236}">
-                <a16:creationId xmlns:a16="http://schemas.microsoft.com/office/drawing/2014/main" id="{34879080-61FE-6B3A-DE61-5C8F6D2A0273}"/>
-              </a:ext>
-            </a:extLst>
-          </p:cNvPr>
-          <p:cNvPicPr>
-            <a:picLocks noGrp="1" noChangeAspect="1"/>
-          </p:cNvPicPr>
-          <p:nvPr>
-            <p:ph sz="half" idx="2"/>
-          </p:nvPr>
-        </p:nvPicPr>
-        <p:blipFill>
-          <a:blip r:embed="rId2"/>
-          <a:stretch>
-            <a:fillRect/>
-          </a:stretch>
-        </p:blipFill>
-        <p:spPr>
-          <a:xfrm>
-            <a:off x="2933407" y="197987"/>
-            <a:ext cx="8912696" cy="5574660"/>
-          </a:xfrm>
-        </p:spPr>
-      </p:pic>
-      <p:sp>
-        <p:nvSpPr>
-          <p:cNvPr id="12" name="TextBox 11">
-            <a:extLst>
-              <a:ext uri="{FF2B5EF4-FFF2-40B4-BE49-F238E27FC236}">
-                <a16:creationId xmlns:a16="http://schemas.microsoft.com/office/drawing/2014/main" id="{F9375A48-11BB-EBB6-6A50-95AB866A6567}"/>
-              </a:ext>
-            </a:extLst>
-          </p:cNvPr>
-          <p:cNvSpPr txBox="1"/>
-          <p:nvPr/>
-        </p:nvSpPr>
-        <p:spPr>
-          <a:xfrm>
-            <a:off x="423643" y="4837163"/>
-            <a:ext cx="2844344" cy="646331"/>
-          </a:xfrm>
-          <a:prstGeom prst="rect">
-            <a:avLst/>
-          </a:prstGeom>
-          <a:noFill/>
-        </p:spPr>
-        <p:txBody>
-          <a:bodyPr wrap="square">
-            <a:spAutoFit/>
+          <a:bodyPr>
+            <a:normAutofit/>
           </a:bodyPr>
           <a:lstStyle/>
           <a:p>
+            <a:pPr>
+              <a:lnSpc>
+                <a:spcPct val="107000"/>
+              </a:lnSpc>
+              <a:spcAft>
+                <a:spcPts val="800"/>
+              </a:spcAft>
+            </a:pPr>
             <a:r>
               <a:rPr lang="en-US" sz="1800" dirty="0">
                 <a:effectLst/>
@@ -8224,16 +8101,164 @@
                 <a:ea typeface="Calibri" panose="020F0502020204030204" pitchFamily="34" charset="0"/>
                 <a:cs typeface="Times New Roman" panose="02020603050405020304" pitchFamily="18" charset="0"/>
               </a:rPr>
-              <a:t>Source: https://docs.docker.com</a:t>
-            </a:r>
+              <a:t>Persisted folders and files on disk. </a:t>
+            </a:r>
+          </a:p>
+          <a:p>
+            <a:pPr>
+              <a:lnSpc>
+                <a:spcPct val="107000"/>
+              </a:lnSpc>
+              <a:spcAft>
+                <a:spcPts val="800"/>
+              </a:spcAft>
+            </a:pPr>
+            <a:r>
+              <a:rPr lang="en-US" sz="1800" dirty="0">
+                <a:effectLst/>
+                <a:latin typeface="Calibri" panose="020F0502020204030204" pitchFamily="34" charset="0"/>
+                <a:ea typeface="Calibri" panose="020F0502020204030204" pitchFamily="34" charset="0"/>
+                <a:cs typeface="Times New Roman" panose="02020603050405020304" pitchFamily="18" charset="0"/>
+              </a:rPr>
+              <a:t>Allows sharing between containers</a:t>
+            </a:r>
+          </a:p>
+          <a:p>
+            <a:pPr>
+              <a:lnSpc>
+                <a:spcPct val="107000"/>
+              </a:lnSpc>
+              <a:spcAft>
+                <a:spcPts val="800"/>
+              </a:spcAft>
+            </a:pPr>
+            <a:r>
+              <a:rPr lang="en-US" sz="1800" dirty="0">
+                <a:effectLst/>
+                <a:latin typeface="Calibri" panose="020F0502020204030204" pitchFamily="34" charset="0"/>
+                <a:ea typeface="Calibri" panose="020F0502020204030204" pitchFamily="34" charset="0"/>
+                <a:cs typeface="Times New Roman" panose="02020603050405020304" pitchFamily="18" charset="0"/>
+              </a:rPr>
+              <a:t>Also for keeping data between container deletion and re-creation! </a:t>
+            </a:r>
+          </a:p>
+          <a:p>
+            <a:pPr lvl="1">
+              <a:lnSpc>
+                <a:spcPct val="107000"/>
+              </a:lnSpc>
+              <a:spcAft>
+                <a:spcPts val="800"/>
+              </a:spcAft>
+            </a:pPr>
+            <a:r>
+              <a:rPr lang="en-US" dirty="0">
+                <a:effectLst/>
+                <a:latin typeface="Calibri" panose="020F0502020204030204" pitchFamily="34" charset="0"/>
+                <a:ea typeface="Calibri" panose="020F0502020204030204" pitchFamily="34" charset="0"/>
+                <a:cs typeface="Times New Roman" panose="02020603050405020304" pitchFamily="18" charset="0"/>
+              </a:rPr>
+              <a:t>(Container is deleted totally, but volume resides by default in the host file system)</a:t>
+            </a:r>
+            <a:endParaRPr lang="fi-FI" dirty="0">
+              <a:effectLst/>
+              <a:latin typeface="Calibri" panose="020F0502020204030204" pitchFamily="34" charset="0"/>
+              <a:ea typeface="Calibri" panose="020F0502020204030204" pitchFamily="34" charset="0"/>
+              <a:cs typeface="Times New Roman" panose="02020603050405020304" pitchFamily="18" charset="0"/>
+            </a:endParaRPr>
+          </a:p>
+          <a:p>
             <a:endParaRPr lang="fi-FI" dirty="0"/>
+          </a:p>
+        </p:txBody>
+      </p:sp>
+      <p:sp>
+        <p:nvSpPr>
+          <p:cNvPr id="5" name="Date Placeholder 4">
+            <a:extLst>
+              <a:ext uri="{FF2B5EF4-FFF2-40B4-BE49-F238E27FC236}">
+                <a16:creationId xmlns:a16="http://schemas.microsoft.com/office/drawing/2014/main" id="{976244E2-AA76-2742-B2EC-FEC79276155C}"/>
+              </a:ext>
+            </a:extLst>
+          </p:cNvPr>
+          <p:cNvSpPr>
+            <a:spLocks noGrp="1"/>
+          </p:cNvSpPr>
+          <p:nvPr>
+            <p:ph type="dt" sz="half" idx="10"/>
+          </p:nvPr>
+        </p:nvSpPr>
+        <p:spPr/>
+        <p:txBody>
+          <a:bodyPr/>
+          <a:lstStyle/>
+          <a:p>
+            <a:fld id="{202E1EC2-47B8-044B-A09E-6A63B4D80C87}" type="datetime1">
+              <a:rPr lang="fi-FI" smtClean="0"/>
+              <a:t>18.2.2024</a:t>
+            </a:fld>
+            <a:endParaRPr lang="en-GB"/>
+          </a:p>
+        </p:txBody>
+      </p:sp>
+      <p:sp>
+        <p:nvSpPr>
+          <p:cNvPr id="6" name="Footer Placeholder 5">
+            <a:extLst>
+              <a:ext uri="{FF2B5EF4-FFF2-40B4-BE49-F238E27FC236}">
+                <a16:creationId xmlns:a16="http://schemas.microsoft.com/office/drawing/2014/main" id="{588CE607-4137-8840-8FEA-42EAC857E3A3}"/>
+              </a:ext>
+            </a:extLst>
+          </p:cNvPr>
+          <p:cNvSpPr>
+            <a:spLocks noGrp="1"/>
+          </p:cNvSpPr>
+          <p:nvPr>
+            <p:ph type="ftr" sz="quarter" idx="11"/>
+          </p:nvPr>
+        </p:nvSpPr>
+        <p:spPr/>
+        <p:txBody>
+          <a:bodyPr/>
+          <a:lstStyle/>
+          <a:p>
+            <a:endParaRPr lang="en-GB"/>
+          </a:p>
+        </p:txBody>
+      </p:sp>
+      <p:sp>
+        <p:nvSpPr>
+          <p:cNvPr id="7" name="Slide Number Placeholder 6">
+            <a:extLst>
+              <a:ext uri="{FF2B5EF4-FFF2-40B4-BE49-F238E27FC236}">
+                <a16:creationId xmlns:a16="http://schemas.microsoft.com/office/drawing/2014/main" id="{2E133A96-6C73-0844-B8CB-27C2B5F4CFB1}"/>
+              </a:ext>
+            </a:extLst>
+          </p:cNvPr>
+          <p:cNvSpPr>
+            <a:spLocks noGrp="1"/>
+          </p:cNvSpPr>
+          <p:nvPr>
+            <p:ph type="sldNum" sz="quarter" idx="12"/>
+          </p:nvPr>
+        </p:nvSpPr>
+        <p:spPr/>
+        <p:txBody>
+          <a:bodyPr/>
+          <a:lstStyle/>
+          <a:p>
+            <a:fld id="{76BAB7ED-EDE9-4D4B-9A2D-30E18C47C16E}" type="slidenum">
+              <a:rPr lang="en-GB" smtClean="0"/>
+              <a:t>14</a:t>
+            </a:fld>
+            <a:endParaRPr lang="en-GB"/>
           </a:p>
         </p:txBody>
       </p:sp>
     </p:spTree>
     <p:extLst>
       <p:ext uri="{BB962C8B-B14F-4D97-AF65-F5344CB8AC3E}">
-        <p14:creationId xmlns:p14="http://schemas.microsoft.com/office/powerpoint/2010/main" val="836683022"/>
+        <p14:creationId xmlns:p14="http://schemas.microsoft.com/office/powerpoint/2010/main" val="1194808136"/>
       </p:ext>
     </p:extLst>
   </p:cSld>
@@ -8283,7 +8308,7 @@
           <a:p>
             <a:r>
               <a:rPr lang="fi-FI" dirty="0" err="1"/>
-              <a:t>network</a:t>
+              <a:t>volume</a:t>
             </a:r>
             <a:endParaRPr lang="fi-FI" dirty="0"/>
           </a:p>
@@ -8291,35 +8316,144 @@
       </p:sp>
       <p:sp>
         <p:nvSpPr>
-          <p:cNvPr id="9" name="Content Placeholder 8">
-            <a:extLst>
-              <a:ext uri="{FF2B5EF4-FFF2-40B4-BE49-F238E27FC236}">
-                <a16:creationId xmlns:a16="http://schemas.microsoft.com/office/drawing/2014/main" id="{ACDE61D8-A75A-F94B-B57A-46F276C03311}"/>
-              </a:ext>
-            </a:extLst>
-          </p:cNvPr>
-          <p:cNvSpPr>
-            <a:spLocks noGrp="1"/>
-          </p:cNvSpPr>
+          <p:cNvPr id="5" name="Date Placeholder 4">
+            <a:extLst>
+              <a:ext uri="{FF2B5EF4-FFF2-40B4-BE49-F238E27FC236}">
+                <a16:creationId xmlns:a16="http://schemas.microsoft.com/office/drawing/2014/main" id="{976244E2-AA76-2742-B2EC-FEC79276155C}"/>
+              </a:ext>
+            </a:extLst>
+          </p:cNvPr>
+          <p:cNvSpPr>
+            <a:spLocks noGrp="1"/>
+          </p:cNvSpPr>
+          <p:nvPr>
+            <p:ph type="dt" sz="half" idx="10"/>
+          </p:nvPr>
+        </p:nvSpPr>
+        <p:spPr/>
+        <p:txBody>
+          <a:bodyPr/>
+          <a:lstStyle/>
+          <a:p>
+            <a:fld id="{202E1EC2-47B8-044B-A09E-6A63B4D80C87}" type="datetime1">
+              <a:rPr lang="fi-FI" smtClean="0"/>
+              <a:t>18.2.2024</a:t>
+            </a:fld>
+            <a:endParaRPr lang="en-GB"/>
+          </a:p>
+        </p:txBody>
+      </p:sp>
+      <p:sp>
+        <p:nvSpPr>
+          <p:cNvPr id="6" name="Footer Placeholder 5">
+            <a:extLst>
+              <a:ext uri="{FF2B5EF4-FFF2-40B4-BE49-F238E27FC236}">
+                <a16:creationId xmlns:a16="http://schemas.microsoft.com/office/drawing/2014/main" id="{588CE607-4137-8840-8FEA-42EAC857E3A3}"/>
+              </a:ext>
+            </a:extLst>
+          </p:cNvPr>
+          <p:cNvSpPr>
+            <a:spLocks noGrp="1"/>
+          </p:cNvSpPr>
+          <p:nvPr>
+            <p:ph type="ftr" sz="quarter" idx="11"/>
+          </p:nvPr>
+        </p:nvSpPr>
+        <p:spPr/>
+        <p:txBody>
+          <a:bodyPr/>
+          <a:lstStyle/>
+          <a:p>
+            <a:endParaRPr lang="en-GB"/>
+          </a:p>
+        </p:txBody>
+      </p:sp>
+      <p:sp>
+        <p:nvSpPr>
+          <p:cNvPr id="7" name="Slide Number Placeholder 6">
+            <a:extLst>
+              <a:ext uri="{FF2B5EF4-FFF2-40B4-BE49-F238E27FC236}">
+                <a16:creationId xmlns:a16="http://schemas.microsoft.com/office/drawing/2014/main" id="{2E133A96-6C73-0844-B8CB-27C2B5F4CFB1}"/>
+              </a:ext>
+            </a:extLst>
+          </p:cNvPr>
+          <p:cNvSpPr>
+            <a:spLocks noGrp="1"/>
+          </p:cNvSpPr>
+          <p:nvPr>
+            <p:ph type="sldNum" sz="quarter" idx="12"/>
+          </p:nvPr>
+        </p:nvSpPr>
+        <p:spPr/>
+        <p:txBody>
+          <a:bodyPr/>
+          <a:lstStyle/>
+          <a:p>
+            <a:fld id="{76BAB7ED-EDE9-4D4B-9A2D-30E18C47C16E}" type="slidenum">
+              <a:rPr lang="en-GB" smtClean="0"/>
+              <a:t>15</a:t>
+            </a:fld>
+            <a:endParaRPr lang="en-GB"/>
+          </a:p>
+        </p:txBody>
+      </p:sp>
+      <p:pic>
+        <p:nvPicPr>
+          <p:cNvPr id="10" name="Content Placeholder 9" descr="A diagram of a computer system&#10;&#10;Description automatically generated">
+            <a:extLst>
+              <a:ext uri="{FF2B5EF4-FFF2-40B4-BE49-F238E27FC236}">
+                <a16:creationId xmlns:a16="http://schemas.microsoft.com/office/drawing/2014/main" id="{34879080-61FE-6B3A-DE61-5C8F6D2A0273}"/>
+              </a:ext>
+            </a:extLst>
+          </p:cNvPr>
+          <p:cNvPicPr>
+            <a:picLocks noGrp="1" noChangeAspect="1"/>
+          </p:cNvPicPr>
           <p:nvPr>
             <p:ph sz="half" idx="2"/>
           </p:nvPr>
-        </p:nvSpPr>
-        <p:spPr/>
-        <p:txBody>
-          <a:bodyPr>
-            <a:normAutofit/>
+        </p:nvPicPr>
+        <p:blipFill>
+          <a:blip r:embed="rId2"/>
+          <a:stretch>
+            <a:fillRect/>
+          </a:stretch>
+        </p:blipFill>
+        <p:spPr>
+          <a:xfrm>
+            <a:off x="2933407" y="197987"/>
+            <a:ext cx="8912696" cy="5574660"/>
+          </a:xfrm>
+        </p:spPr>
+      </p:pic>
+      <p:sp>
+        <p:nvSpPr>
+          <p:cNvPr id="12" name="TextBox 11">
+            <a:extLst>
+              <a:ext uri="{FF2B5EF4-FFF2-40B4-BE49-F238E27FC236}">
+                <a16:creationId xmlns:a16="http://schemas.microsoft.com/office/drawing/2014/main" id="{F9375A48-11BB-EBB6-6A50-95AB866A6567}"/>
+              </a:ext>
+            </a:extLst>
+          </p:cNvPr>
+          <p:cNvSpPr txBox="1"/>
+          <p:nvPr/>
+        </p:nvSpPr>
+        <p:spPr>
+          <a:xfrm>
+            <a:off x="423643" y="4837163"/>
+            <a:ext cx="2844344" cy="646331"/>
+          </a:xfrm>
+          <a:prstGeom prst="rect">
+            <a:avLst/>
+          </a:prstGeom>
+          <a:noFill/>
+        </p:spPr>
+        <p:txBody>
+          <a:bodyPr wrap="square">
+            <a:spAutoFit/>
           </a:bodyPr>
           <a:lstStyle/>
           <a:p>
-            <a:pPr>
-              <a:lnSpc>
-                <a:spcPct val="107000"/>
-              </a:lnSpc>
-              <a:spcAft>
-                <a:spcPts val="800"/>
-              </a:spcAft>
-            </a:pPr>
             <a:r>
               <a:rPr lang="en-US" sz="1800" dirty="0">
                 <a:effectLst/>
@@ -8327,289 +8461,16 @@
                 <a:ea typeface="Calibri" panose="020F0502020204030204" pitchFamily="34" charset="0"/>
                 <a:cs typeface="Times New Roman" panose="02020603050405020304" pitchFamily="18" charset="0"/>
               </a:rPr>
-              <a:t>Allows (by default isolated) containers to communicate with each other, or the host computer</a:t>
-            </a:r>
-          </a:p>
-          <a:p>
-            <a:pPr>
-              <a:lnSpc>
-                <a:spcPct val="107000"/>
-              </a:lnSpc>
-              <a:spcAft>
-                <a:spcPts val="800"/>
-              </a:spcAft>
-            </a:pPr>
-            <a:r>
-              <a:rPr lang="en-US" sz="1800" dirty="0">
-                <a:effectLst/>
-                <a:latin typeface="Calibri" panose="020F0502020204030204" pitchFamily="34" charset="0"/>
-                <a:ea typeface="Calibri" panose="020F0502020204030204" pitchFamily="34" charset="0"/>
-                <a:cs typeface="Times New Roman" panose="02020603050405020304" pitchFamily="18" charset="0"/>
-                <a:hlinkClick r:id="rId2"/>
-              </a:rPr>
-              <a:t>https://www.docker.com/blog/docker-compose-networking/</a:t>
-            </a:r>
-            <a:r>
-              <a:rPr lang="en-US" dirty="0">
-                <a:latin typeface="Calibri" panose="020F0502020204030204" pitchFamily="34" charset="0"/>
-                <a:ea typeface="Calibri" panose="020F0502020204030204" pitchFamily="34" charset="0"/>
-                <a:cs typeface="Times New Roman" panose="02020603050405020304" pitchFamily="18" charset="0"/>
-              </a:rPr>
-              <a:t> </a:t>
-            </a:r>
-            <a:endParaRPr lang="en-US" sz="1800" dirty="0">
-              <a:effectLst/>
-              <a:latin typeface="Calibri" panose="020F0502020204030204" pitchFamily="34" charset="0"/>
-              <a:ea typeface="Calibri" panose="020F0502020204030204" pitchFamily="34" charset="0"/>
-              <a:cs typeface="Times New Roman" panose="02020603050405020304" pitchFamily="18" charset="0"/>
-            </a:endParaRPr>
-          </a:p>
-          <a:p>
-            <a:pPr>
-              <a:lnSpc>
-                <a:spcPct val="107000"/>
-              </a:lnSpc>
-              <a:spcAft>
-                <a:spcPts val="800"/>
-              </a:spcAft>
-            </a:pPr>
-            <a:r>
-              <a:rPr lang="en-US" dirty="0">
-                <a:latin typeface="Calibri" panose="020F0502020204030204" pitchFamily="34" charset="0"/>
-                <a:ea typeface="Calibri" panose="020F0502020204030204" pitchFamily="34" charset="0"/>
-                <a:cs typeface="Times New Roman" panose="02020603050405020304" pitchFamily="18" charset="0"/>
-              </a:rPr>
-              <a:t>There are multiple network configurations available, e.g. Bridge, Host, Overlay, none</a:t>
-            </a:r>
-            <a:endParaRPr lang="en-US" sz="1800" dirty="0">
-              <a:effectLst/>
-              <a:latin typeface="Calibri" panose="020F0502020204030204" pitchFamily="34" charset="0"/>
-              <a:ea typeface="Calibri" panose="020F0502020204030204" pitchFamily="34" charset="0"/>
-              <a:cs typeface="Times New Roman" panose="02020603050405020304" pitchFamily="18" charset="0"/>
-            </a:endParaRPr>
-          </a:p>
-          <a:p>
-            <a:pPr>
-              <a:lnSpc>
-                <a:spcPct val="107000"/>
-              </a:lnSpc>
-              <a:spcAft>
-                <a:spcPts val="800"/>
-              </a:spcAft>
-            </a:pPr>
-            <a:r>
-              <a:rPr lang="en-US" sz="1800" dirty="0">
-                <a:effectLst/>
-                <a:latin typeface="Calibri" panose="020F0502020204030204" pitchFamily="34" charset="0"/>
-                <a:ea typeface="Calibri" panose="020F0502020204030204" pitchFamily="34" charset="0"/>
-                <a:cs typeface="Times New Roman" panose="02020603050405020304" pitchFamily="18" charset="0"/>
-                <a:hlinkClick r:id="rId3"/>
-              </a:rPr>
-              <a:t>https://docs.docker.com/network/drivers/bridge/</a:t>
-            </a:r>
-            <a:r>
-              <a:rPr lang="en-US" dirty="0">
-                <a:latin typeface="Calibri" panose="020F0502020204030204" pitchFamily="34" charset="0"/>
-                <a:ea typeface="Calibri" panose="020F0502020204030204" pitchFamily="34" charset="0"/>
-                <a:cs typeface="Times New Roman" panose="02020603050405020304" pitchFamily="18" charset="0"/>
-              </a:rPr>
-              <a:t>   </a:t>
-            </a:r>
-            <a:r>
-              <a:rPr lang="en-US" b="1" dirty="0">
-                <a:latin typeface="Calibri" panose="020F0502020204030204" pitchFamily="34" charset="0"/>
-                <a:ea typeface="Calibri" panose="020F0502020204030204" pitchFamily="34" charset="0"/>
-                <a:cs typeface="Times New Roman" panose="02020603050405020304" pitchFamily="18" charset="0"/>
-              </a:rPr>
-              <a:t>Bridge</a:t>
-            </a:r>
-            <a:r>
-              <a:rPr lang="en-US" dirty="0">
-                <a:latin typeface="Calibri" panose="020F0502020204030204" pitchFamily="34" charset="0"/>
-                <a:ea typeface="Calibri" panose="020F0502020204030204" pitchFamily="34" charset="0"/>
-                <a:cs typeface="Times New Roman" panose="02020603050405020304" pitchFamily="18" charset="0"/>
-              </a:rPr>
-              <a:t> is the normal one, letting included containers communicate with each other.</a:t>
-            </a:r>
-          </a:p>
-          <a:p>
-            <a:pPr>
-              <a:lnSpc>
-                <a:spcPct val="107000"/>
-              </a:lnSpc>
-              <a:spcAft>
-                <a:spcPts val="800"/>
-              </a:spcAft>
-            </a:pPr>
-            <a:r>
-              <a:rPr lang="en-US" sz="1800" dirty="0">
-                <a:effectLst/>
-                <a:latin typeface="Calibri" panose="020F0502020204030204" pitchFamily="34" charset="0"/>
-                <a:ea typeface="Calibri" panose="020F0502020204030204" pitchFamily="34" charset="0"/>
-                <a:cs typeface="Times New Roman" panose="02020603050405020304" pitchFamily="18" charset="0"/>
-                <a:hlinkClick r:id="rId4"/>
-              </a:rPr>
-              <a:t>https://docs.docker.com/network/drivers/host/</a:t>
-            </a:r>
-            <a:r>
-              <a:rPr lang="en-US" sz="1800" dirty="0">
-                <a:effectLst/>
-                <a:latin typeface="Calibri" panose="020F0502020204030204" pitchFamily="34" charset="0"/>
-                <a:ea typeface="Calibri" panose="020F0502020204030204" pitchFamily="34" charset="0"/>
-                <a:cs typeface="Times New Roman" panose="02020603050405020304" pitchFamily="18" charset="0"/>
-              </a:rPr>
-              <a:t> </a:t>
-            </a:r>
-            <a:r>
-              <a:rPr lang="en-US" sz="1800" b="1" dirty="0">
-                <a:effectLst/>
-                <a:latin typeface="Calibri" panose="020F0502020204030204" pitchFamily="34" charset="0"/>
-                <a:ea typeface="Calibri" panose="020F0502020204030204" pitchFamily="34" charset="0"/>
-                <a:cs typeface="Times New Roman" panose="02020603050405020304" pitchFamily="18" charset="0"/>
-              </a:rPr>
-              <a:t>Host</a:t>
-            </a:r>
-            <a:r>
-              <a:rPr lang="en-US" sz="1800" dirty="0">
-                <a:effectLst/>
-                <a:latin typeface="Calibri" panose="020F0502020204030204" pitchFamily="34" charset="0"/>
-                <a:ea typeface="Calibri" panose="020F0502020204030204" pitchFamily="34" charset="0"/>
-                <a:cs typeface="Times New Roman" panose="02020603050405020304" pitchFamily="18" charset="0"/>
-              </a:rPr>
-              <a:t> refers to the host computer where Docker engine is run. Do you want to e.g. </a:t>
-            </a:r>
-            <a:r>
-              <a:rPr lang="en-US" dirty="0">
-                <a:latin typeface="Calibri" panose="020F0502020204030204" pitchFamily="34" charset="0"/>
-                <a:ea typeface="Calibri" panose="020F0502020204030204" pitchFamily="34" charset="0"/>
-                <a:cs typeface="Times New Roman" panose="02020603050405020304" pitchFamily="18" charset="0"/>
-              </a:rPr>
-              <a:t>let the containers interact with your host computer services? Sometimes absolutely not, some rare times yes.</a:t>
-            </a:r>
-            <a:endParaRPr lang="en-US" sz="1800" dirty="0">
-              <a:effectLst/>
-              <a:latin typeface="Calibri" panose="020F0502020204030204" pitchFamily="34" charset="0"/>
-              <a:ea typeface="Calibri" panose="020F0502020204030204" pitchFamily="34" charset="0"/>
-              <a:cs typeface="Times New Roman" panose="02020603050405020304" pitchFamily="18" charset="0"/>
-            </a:endParaRPr>
-          </a:p>
-          <a:p>
-            <a:pPr>
-              <a:lnSpc>
-                <a:spcPct val="107000"/>
-              </a:lnSpc>
-              <a:spcAft>
-                <a:spcPts val="800"/>
-              </a:spcAft>
-            </a:pPr>
-            <a:r>
-              <a:rPr lang="en-US" sz="1800" dirty="0">
-                <a:effectLst/>
-                <a:latin typeface="Calibri" panose="020F0502020204030204" pitchFamily="34" charset="0"/>
-                <a:ea typeface="Calibri" panose="020F0502020204030204" pitchFamily="34" charset="0"/>
-                <a:cs typeface="Times New Roman" panose="02020603050405020304" pitchFamily="18" charset="0"/>
-              </a:rPr>
-              <a:t>Also for keeping data between container deletion and re-creation!</a:t>
-            </a:r>
-            <a:endParaRPr lang="fi-FI" sz="1800" dirty="0">
-              <a:effectLst/>
-              <a:latin typeface="Calibri" panose="020F0502020204030204" pitchFamily="34" charset="0"/>
-              <a:ea typeface="Calibri" panose="020F0502020204030204" pitchFamily="34" charset="0"/>
-              <a:cs typeface="Times New Roman" panose="02020603050405020304" pitchFamily="18" charset="0"/>
-            </a:endParaRPr>
-          </a:p>
-          <a:p>
+              <a:t>Source: https://docs.docker.com</a:t>
+            </a:r>
             <a:endParaRPr lang="fi-FI" dirty="0"/>
-          </a:p>
-        </p:txBody>
-      </p:sp>
-      <p:sp>
-        <p:nvSpPr>
-          <p:cNvPr id="5" name="Date Placeholder 4">
-            <a:extLst>
-              <a:ext uri="{FF2B5EF4-FFF2-40B4-BE49-F238E27FC236}">
-                <a16:creationId xmlns:a16="http://schemas.microsoft.com/office/drawing/2014/main" id="{976244E2-AA76-2742-B2EC-FEC79276155C}"/>
-              </a:ext>
-            </a:extLst>
-          </p:cNvPr>
-          <p:cNvSpPr>
-            <a:spLocks noGrp="1"/>
-          </p:cNvSpPr>
-          <p:nvPr>
-            <p:ph type="dt" sz="half" idx="10"/>
-          </p:nvPr>
-        </p:nvSpPr>
-        <p:spPr/>
-        <p:txBody>
-          <a:bodyPr/>
-          <a:lstStyle/>
-          <a:p>
-            <a:fld id="{202E1EC2-47B8-044B-A09E-6A63B4D80C87}" type="datetime1">
-              <a:rPr lang="fi-FI" smtClean="0"/>
-              <a:t>25.1.2024</a:t>
-            </a:fld>
-            <a:endParaRPr lang="en-GB"/>
-          </a:p>
-        </p:txBody>
-      </p:sp>
-      <p:sp>
-        <p:nvSpPr>
-          <p:cNvPr id="6" name="Footer Placeholder 5">
-            <a:extLst>
-              <a:ext uri="{FF2B5EF4-FFF2-40B4-BE49-F238E27FC236}">
-                <a16:creationId xmlns:a16="http://schemas.microsoft.com/office/drawing/2014/main" id="{588CE607-4137-8840-8FEA-42EAC857E3A3}"/>
-              </a:ext>
-            </a:extLst>
-          </p:cNvPr>
-          <p:cNvSpPr>
-            <a:spLocks noGrp="1"/>
-          </p:cNvSpPr>
-          <p:nvPr>
-            <p:ph type="ftr" sz="quarter" idx="11"/>
-          </p:nvPr>
-        </p:nvSpPr>
-        <p:spPr/>
-        <p:txBody>
-          <a:bodyPr/>
-          <a:lstStyle/>
-          <a:p>
-            <a:endParaRPr lang="en-GB"/>
-          </a:p>
-        </p:txBody>
-      </p:sp>
-      <p:sp>
-        <p:nvSpPr>
-          <p:cNvPr id="7" name="Slide Number Placeholder 6">
-            <a:extLst>
-              <a:ext uri="{FF2B5EF4-FFF2-40B4-BE49-F238E27FC236}">
-                <a16:creationId xmlns:a16="http://schemas.microsoft.com/office/drawing/2014/main" id="{2E133A96-6C73-0844-B8CB-27C2B5F4CFB1}"/>
-              </a:ext>
-            </a:extLst>
-          </p:cNvPr>
-          <p:cNvSpPr>
-            <a:spLocks noGrp="1"/>
-          </p:cNvSpPr>
-          <p:nvPr>
-            <p:ph type="sldNum" sz="quarter" idx="12"/>
-          </p:nvPr>
-        </p:nvSpPr>
-        <p:spPr/>
-        <p:txBody>
-          <a:bodyPr/>
-          <a:lstStyle/>
-          <a:p>
-            <a:fld id="{76BAB7ED-EDE9-4D4B-9A2D-30E18C47C16E}" type="slidenum">
-              <a:rPr lang="en-GB" smtClean="0"/>
-              <a:t>15</a:t>
-            </a:fld>
-            <a:endParaRPr lang="en-GB"/>
           </a:p>
         </p:txBody>
       </p:sp>
     </p:spTree>
     <p:extLst>
       <p:ext uri="{BB962C8B-B14F-4D97-AF65-F5344CB8AC3E}">
-        <p14:creationId xmlns:p14="http://schemas.microsoft.com/office/powerpoint/2010/main" val="3362218849"/>
+        <p14:creationId xmlns:p14="http://schemas.microsoft.com/office/powerpoint/2010/main" val="836683022"/>
       </p:ext>
     </p:extLst>
   </p:cSld>
@@ -8667,115 +8528,40 @@
       </p:sp>
       <p:sp>
         <p:nvSpPr>
-          <p:cNvPr id="5" name="Date Placeholder 4">
-            <a:extLst>
-              <a:ext uri="{FF2B5EF4-FFF2-40B4-BE49-F238E27FC236}">
-                <a16:creationId xmlns:a16="http://schemas.microsoft.com/office/drawing/2014/main" id="{976244E2-AA76-2742-B2EC-FEC79276155C}"/>
-              </a:ext>
-            </a:extLst>
-          </p:cNvPr>
-          <p:cNvSpPr>
-            <a:spLocks noGrp="1"/>
-          </p:cNvSpPr>
-          <p:nvPr>
-            <p:ph type="dt" sz="half" idx="10"/>
-          </p:nvPr>
-        </p:nvSpPr>
-        <p:spPr/>
-        <p:txBody>
-          <a:bodyPr/>
-          <a:lstStyle/>
-          <a:p>
-            <a:fld id="{202E1EC2-47B8-044B-A09E-6A63B4D80C87}" type="datetime1">
-              <a:rPr lang="fi-FI" smtClean="0"/>
-              <a:t>25.1.2024</a:t>
-            </a:fld>
-            <a:endParaRPr lang="en-GB"/>
-          </a:p>
-        </p:txBody>
-      </p:sp>
-      <p:sp>
-        <p:nvSpPr>
-          <p:cNvPr id="6" name="Footer Placeholder 5">
-            <a:extLst>
-              <a:ext uri="{FF2B5EF4-FFF2-40B4-BE49-F238E27FC236}">
-                <a16:creationId xmlns:a16="http://schemas.microsoft.com/office/drawing/2014/main" id="{588CE607-4137-8840-8FEA-42EAC857E3A3}"/>
-              </a:ext>
-            </a:extLst>
-          </p:cNvPr>
-          <p:cNvSpPr>
-            <a:spLocks noGrp="1"/>
-          </p:cNvSpPr>
-          <p:nvPr>
-            <p:ph type="ftr" sz="quarter" idx="11"/>
-          </p:nvPr>
-        </p:nvSpPr>
-        <p:spPr/>
-        <p:txBody>
-          <a:bodyPr/>
-          <a:lstStyle/>
-          <a:p>
-            <a:endParaRPr lang="en-GB"/>
-          </a:p>
-        </p:txBody>
-      </p:sp>
-      <p:sp>
-        <p:nvSpPr>
-          <p:cNvPr id="7" name="Slide Number Placeholder 6">
-            <a:extLst>
-              <a:ext uri="{FF2B5EF4-FFF2-40B4-BE49-F238E27FC236}">
-                <a16:creationId xmlns:a16="http://schemas.microsoft.com/office/drawing/2014/main" id="{2E133A96-6C73-0844-B8CB-27C2B5F4CFB1}"/>
-              </a:ext>
-            </a:extLst>
-          </p:cNvPr>
-          <p:cNvSpPr>
-            <a:spLocks noGrp="1"/>
-          </p:cNvSpPr>
-          <p:nvPr>
-            <p:ph type="sldNum" sz="quarter" idx="12"/>
-          </p:nvPr>
-        </p:nvSpPr>
-        <p:spPr/>
-        <p:txBody>
-          <a:bodyPr/>
-          <a:lstStyle/>
-          <a:p>
-            <a:fld id="{76BAB7ED-EDE9-4D4B-9A2D-30E18C47C16E}" type="slidenum">
-              <a:rPr lang="en-GB" smtClean="0"/>
-              <a:t>16</a:t>
-            </a:fld>
-            <a:endParaRPr lang="en-GB"/>
-          </a:p>
-        </p:txBody>
-      </p:sp>
-      <p:sp>
-        <p:nvSpPr>
-          <p:cNvPr id="12" name="TextBox 11">
-            <a:extLst>
-              <a:ext uri="{FF2B5EF4-FFF2-40B4-BE49-F238E27FC236}">
-                <a16:creationId xmlns:a16="http://schemas.microsoft.com/office/drawing/2014/main" id="{F9375A48-11BB-EBB6-6A50-95AB866A6567}"/>
-              </a:ext>
-            </a:extLst>
-          </p:cNvPr>
-          <p:cNvSpPr txBox="1"/>
-          <p:nvPr/>
+          <p:cNvPr id="9" name="Content Placeholder 8">
+            <a:extLst>
+              <a:ext uri="{FF2B5EF4-FFF2-40B4-BE49-F238E27FC236}">
+                <a16:creationId xmlns:a16="http://schemas.microsoft.com/office/drawing/2014/main" id="{ACDE61D8-A75A-F94B-B57A-46F276C03311}"/>
+              </a:ext>
+            </a:extLst>
+          </p:cNvPr>
+          <p:cNvSpPr>
+            <a:spLocks noGrp="1"/>
+          </p:cNvSpPr>
+          <p:nvPr>
+            <p:ph sz="half" idx="2"/>
+          </p:nvPr>
         </p:nvSpPr>
         <p:spPr>
           <a:xfrm>
-            <a:off x="423643" y="4837163"/>
-            <a:ext cx="2844344" cy="646331"/>
+            <a:off x="550864" y="1091001"/>
+            <a:ext cx="11125198" cy="4822437"/>
           </a:xfrm>
-          <a:prstGeom prst="rect">
-            <a:avLst/>
-          </a:prstGeom>
-          <a:noFill/>
         </p:spPr>
         <p:txBody>
-          <a:bodyPr wrap="square">
-            <a:spAutoFit/>
+          <a:bodyPr>
+            <a:normAutofit fontScale="92500" lnSpcReduction="20000"/>
           </a:bodyPr>
           <a:lstStyle/>
           <a:p>
+            <a:pPr>
+              <a:lnSpc>
+                <a:spcPct val="107000"/>
+              </a:lnSpc>
+              <a:spcAft>
+                <a:spcPts val="800"/>
+              </a:spcAft>
+            </a:pPr>
             <a:r>
               <a:rPr lang="en-US" sz="1800" dirty="0">
                 <a:effectLst/>
@@ -8783,45 +8569,424 @@
                 <a:ea typeface="Calibri" panose="020F0502020204030204" pitchFamily="34" charset="0"/>
                 <a:cs typeface="Times New Roman" panose="02020603050405020304" pitchFamily="18" charset="0"/>
               </a:rPr>
-              <a:t>Source: https://docs.docker.com</a:t>
-            </a:r>
+              <a:t>Allows (by default isolated) containers to communicate with each other, or the host computer</a:t>
+            </a:r>
+          </a:p>
+          <a:p>
+            <a:pPr>
+              <a:lnSpc>
+                <a:spcPct val="107000"/>
+              </a:lnSpc>
+              <a:spcAft>
+                <a:spcPts val="800"/>
+              </a:spcAft>
+            </a:pPr>
+            <a:r>
+              <a:rPr lang="en-US" sz="1800" dirty="0">
+                <a:effectLst/>
+                <a:latin typeface="Calibri" panose="020F0502020204030204" pitchFamily="34" charset="0"/>
+                <a:ea typeface="Calibri" panose="020F0502020204030204" pitchFamily="34" charset="0"/>
+                <a:cs typeface="Times New Roman" panose="02020603050405020304" pitchFamily="18" charset="0"/>
+                <a:hlinkClick r:id="rId2"/>
+              </a:rPr>
+              <a:t>https://www.docker.com/blog/docker-compose-networking/</a:t>
+            </a:r>
+            <a:r>
+              <a:rPr lang="en-US" dirty="0">
+                <a:latin typeface="Calibri" panose="020F0502020204030204" pitchFamily="34" charset="0"/>
+                <a:ea typeface="Calibri" panose="020F0502020204030204" pitchFamily="34" charset="0"/>
+                <a:cs typeface="Times New Roman" panose="02020603050405020304" pitchFamily="18" charset="0"/>
+              </a:rPr>
+              <a:t> </a:t>
+            </a:r>
+            <a:endParaRPr lang="en-US" sz="1800" dirty="0">
+              <a:effectLst/>
+              <a:latin typeface="Calibri" panose="020F0502020204030204" pitchFamily="34" charset="0"/>
+              <a:ea typeface="Calibri" panose="020F0502020204030204" pitchFamily="34" charset="0"/>
+              <a:cs typeface="Times New Roman" panose="02020603050405020304" pitchFamily="18" charset="0"/>
+            </a:endParaRPr>
+          </a:p>
+          <a:p>
+            <a:pPr>
+              <a:lnSpc>
+                <a:spcPct val="107000"/>
+              </a:lnSpc>
+              <a:spcAft>
+                <a:spcPts val="800"/>
+              </a:spcAft>
+            </a:pPr>
+            <a:r>
+              <a:rPr lang="en-US" dirty="0">
+                <a:latin typeface="Calibri" panose="020F0502020204030204" pitchFamily="34" charset="0"/>
+                <a:ea typeface="Calibri" panose="020F0502020204030204" pitchFamily="34" charset="0"/>
+                <a:cs typeface="Times New Roman" panose="02020603050405020304" pitchFamily="18" charset="0"/>
+              </a:rPr>
+              <a:t>There are multiple network configurations available, e.g. Bridge, Host, none, (Overlay, etc.)</a:t>
+            </a:r>
+            <a:endParaRPr lang="en-US" sz="1800" dirty="0">
+              <a:effectLst/>
+              <a:latin typeface="Calibri" panose="020F0502020204030204" pitchFamily="34" charset="0"/>
+              <a:ea typeface="Calibri" panose="020F0502020204030204" pitchFamily="34" charset="0"/>
+              <a:cs typeface="Times New Roman" panose="02020603050405020304" pitchFamily="18" charset="0"/>
+            </a:endParaRPr>
+          </a:p>
+          <a:p>
+            <a:pPr>
+              <a:lnSpc>
+                <a:spcPct val="107000"/>
+              </a:lnSpc>
+              <a:spcAft>
+                <a:spcPts val="800"/>
+              </a:spcAft>
+            </a:pPr>
+            <a:r>
+              <a:rPr lang="en-US" sz="1800" dirty="0">
+                <a:effectLst/>
+                <a:latin typeface="Calibri" panose="020F0502020204030204" pitchFamily="34" charset="0"/>
+                <a:ea typeface="Calibri" panose="020F0502020204030204" pitchFamily="34" charset="0"/>
+                <a:cs typeface="Times New Roman" panose="02020603050405020304" pitchFamily="18" charset="0"/>
+                <a:hlinkClick r:id="rId3"/>
+              </a:rPr>
+              <a:t>https://docs.docker.com/network/drivers/bridge/</a:t>
+            </a:r>
+            <a:r>
+              <a:rPr lang="en-US" dirty="0">
+                <a:latin typeface="Calibri" panose="020F0502020204030204" pitchFamily="34" charset="0"/>
+                <a:ea typeface="Calibri" panose="020F0502020204030204" pitchFamily="34" charset="0"/>
+                <a:cs typeface="Times New Roman" panose="02020603050405020304" pitchFamily="18" charset="0"/>
+              </a:rPr>
+              <a:t>   </a:t>
+            </a:r>
+            <a:r>
+              <a:rPr lang="en-US" b="1" dirty="0">
+                <a:latin typeface="Calibri" panose="020F0502020204030204" pitchFamily="34" charset="0"/>
+                <a:ea typeface="Calibri" panose="020F0502020204030204" pitchFamily="34" charset="0"/>
+                <a:cs typeface="Times New Roman" panose="02020603050405020304" pitchFamily="18" charset="0"/>
+              </a:rPr>
+              <a:t>Bridge</a:t>
+            </a:r>
+            <a:r>
+              <a:rPr lang="en-US" dirty="0">
+                <a:latin typeface="Calibri" panose="020F0502020204030204" pitchFamily="34" charset="0"/>
+                <a:ea typeface="Calibri" panose="020F0502020204030204" pitchFamily="34" charset="0"/>
+                <a:cs typeface="Times New Roman" panose="02020603050405020304" pitchFamily="18" charset="0"/>
+              </a:rPr>
+              <a:t> network is the normal one, letting included containers communicate with each other.</a:t>
+            </a:r>
+          </a:p>
+          <a:p>
+            <a:pPr lvl="1">
+              <a:lnSpc>
+                <a:spcPct val="107000"/>
+              </a:lnSpc>
+              <a:spcAft>
+                <a:spcPts val="800"/>
+              </a:spcAft>
+            </a:pPr>
+            <a:r>
+              <a:rPr lang="en-US" b="1" dirty="0" err="1">
+                <a:highlight>
+                  <a:srgbClr val="00FF00"/>
+                </a:highlight>
+                <a:latin typeface="Calibri" panose="020F0502020204030204" pitchFamily="34" charset="0"/>
+                <a:ea typeface="Calibri" panose="020F0502020204030204" pitchFamily="34" charset="0"/>
+                <a:cs typeface="Times New Roman" panose="02020603050405020304" pitchFamily="18" charset="0"/>
+              </a:rPr>
+              <a:t>i</a:t>
+            </a:r>
+            <a:r>
+              <a:rPr lang="en-US" b="1" dirty="0">
+                <a:highlight>
+                  <a:srgbClr val="00FF00"/>
+                </a:highlight>
+                <a:latin typeface="Calibri" panose="020F0502020204030204" pitchFamily="34" charset="0"/>
+                <a:ea typeface="Calibri" panose="020F0502020204030204" pitchFamily="34" charset="0"/>
+                <a:cs typeface="Times New Roman" panose="02020603050405020304" pitchFamily="18" charset="0"/>
+              </a:rPr>
+              <a:t>) default</a:t>
+            </a:r>
+            <a:r>
+              <a:rPr lang="en-US" dirty="0">
+                <a:highlight>
+                  <a:srgbClr val="00FF00"/>
+                </a:highlight>
+                <a:latin typeface="Calibri" panose="020F0502020204030204" pitchFamily="34" charset="0"/>
+                <a:ea typeface="Calibri" panose="020F0502020204030204" pitchFamily="34" charset="0"/>
+                <a:cs typeface="Times New Roman" panose="02020603050405020304" pitchFamily="18" charset="0"/>
+              </a:rPr>
+              <a:t> bridge</a:t>
+            </a:r>
+            <a:r>
+              <a:rPr lang="en-US" dirty="0">
+                <a:latin typeface="Calibri" panose="020F0502020204030204" pitchFamily="34" charset="0"/>
+                <a:ea typeface="Calibri" panose="020F0502020204030204" pitchFamily="34" charset="0"/>
+                <a:cs typeface="Times New Roman" panose="02020603050405020304" pitchFamily="18" charset="0"/>
+              </a:rPr>
+              <a:t>, automatic when you don’t specify any network. If you expose ports, they are visible in the host computer.</a:t>
+            </a:r>
+          </a:p>
+          <a:p>
+            <a:pPr lvl="1">
+              <a:lnSpc>
+                <a:spcPct val="107000"/>
+              </a:lnSpc>
+              <a:spcAft>
+                <a:spcPts val="800"/>
+              </a:spcAft>
+            </a:pPr>
+            <a:r>
+              <a:rPr lang="en-US" b="1" dirty="0">
+                <a:highlight>
+                  <a:srgbClr val="00FF00"/>
+                </a:highlight>
+                <a:latin typeface="Calibri" panose="020F0502020204030204" pitchFamily="34" charset="0"/>
+                <a:ea typeface="Calibri" panose="020F0502020204030204" pitchFamily="34" charset="0"/>
+                <a:cs typeface="Times New Roman" panose="02020603050405020304" pitchFamily="18" charset="0"/>
+              </a:rPr>
+              <a:t>ii) User-defined Bridge</a:t>
+            </a:r>
+            <a:r>
+              <a:rPr lang="en-US" dirty="0">
+                <a:latin typeface="Calibri" panose="020F0502020204030204" pitchFamily="34" charset="0"/>
+                <a:ea typeface="Calibri" panose="020F0502020204030204" pitchFamily="34" charset="0"/>
+                <a:cs typeface="Times New Roman" panose="02020603050405020304" pitchFamily="18" charset="0"/>
+              </a:rPr>
+              <a:t>, now you can use DNS name resolution, containers keep their DNS name. Usually </a:t>
+            </a:r>
+            <a:r>
+              <a:rPr lang="en-US" u="sng" dirty="0">
+                <a:latin typeface="Calibri" panose="020F0502020204030204" pitchFamily="34" charset="0"/>
+                <a:ea typeface="Calibri" panose="020F0502020204030204" pitchFamily="34" charset="0"/>
+                <a:cs typeface="Times New Roman" panose="02020603050405020304" pitchFamily="18" charset="0"/>
+              </a:rPr>
+              <a:t>the recommended network</a:t>
+            </a:r>
+            <a:r>
+              <a:rPr lang="en-US" dirty="0">
+                <a:latin typeface="Calibri" panose="020F0502020204030204" pitchFamily="34" charset="0"/>
+                <a:ea typeface="Calibri" panose="020F0502020204030204" pitchFamily="34" charset="0"/>
+                <a:cs typeface="Times New Roman" panose="02020603050405020304" pitchFamily="18" charset="0"/>
+              </a:rPr>
+              <a:t> in docker, especially when e.g. having backend container communicating internally with database container!</a:t>
+            </a:r>
+          </a:p>
+          <a:p>
+            <a:pPr>
+              <a:lnSpc>
+                <a:spcPct val="107000"/>
+              </a:lnSpc>
+              <a:spcAft>
+                <a:spcPts val="800"/>
+              </a:spcAft>
+            </a:pPr>
+            <a:r>
+              <a:rPr lang="en-US" sz="1800" dirty="0">
+                <a:effectLst/>
+                <a:latin typeface="Calibri" panose="020F0502020204030204" pitchFamily="34" charset="0"/>
+                <a:ea typeface="Calibri" panose="020F0502020204030204" pitchFamily="34" charset="0"/>
+                <a:cs typeface="Times New Roman" panose="02020603050405020304" pitchFamily="18" charset="0"/>
+                <a:hlinkClick r:id="rId4"/>
+              </a:rPr>
+              <a:t>https://docs.docker.com/network/drivers/host/</a:t>
+            </a:r>
+            <a:r>
+              <a:rPr lang="en-US" sz="1800" dirty="0">
+                <a:effectLst/>
+                <a:latin typeface="Calibri" panose="020F0502020204030204" pitchFamily="34" charset="0"/>
+                <a:ea typeface="Calibri" panose="020F0502020204030204" pitchFamily="34" charset="0"/>
+                <a:cs typeface="Times New Roman" panose="02020603050405020304" pitchFamily="18" charset="0"/>
+              </a:rPr>
+              <a:t> </a:t>
+            </a:r>
+            <a:r>
+              <a:rPr lang="en-US" sz="1800" b="1" dirty="0">
+                <a:effectLst/>
+                <a:highlight>
+                  <a:srgbClr val="00FF00"/>
+                </a:highlight>
+                <a:latin typeface="Calibri" panose="020F0502020204030204" pitchFamily="34" charset="0"/>
+                <a:ea typeface="Calibri" panose="020F0502020204030204" pitchFamily="34" charset="0"/>
+                <a:cs typeface="Times New Roman" panose="02020603050405020304" pitchFamily="18" charset="0"/>
+              </a:rPr>
+              <a:t>iii) Host </a:t>
+            </a:r>
+            <a:r>
+              <a:rPr lang="en-US" sz="1800" dirty="0">
+                <a:effectLst/>
+                <a:highlight>
+                  <a:srgbClr val="00FF00"/>
+                </a:highlight>
+                <a:latin typeface="Calibri" panose="020F0502020204030204" pitchFamily="34" charset="0"/>
+                <a:ea typeface="Calibri" panose="020F0502020204030204" pitchFamily="34" charset="0"/>
+                <a:cs typeface="Times New Roman" panose="02020603050405020304" pitchFamily="18" charset="0"/>
+              </a:rPr>
+              <a:t>network</a:t>
+            </a:r>
+            <a:r>
+              <a:rPr lang="en-US" sz="1800" dirty="0">
+                <a:effectLst/>
+                <a:latin typeface="Calibri" panose="020F0502020204030204" pitchFamily="34" charset="0"/>
+                <a:ea typeface="Calibri" panose="020F0502020204030204" pitchFamily="34" charset="0"/>
+                <a:cs typeface="Times New Roman" panose="02020603050405020304" pitchFamily="18" charset="0"/>
+              </a:rPr>
+              <a:t> refers to the host computer where Docker engine is run. Do you want to e.g. </a:t>
+            </a:r>
+            <a:r>
+              <a:rPr lang="en-US" dirty="0">
+                <a:latin typeface="Calibri" panose="020F0502020204030204" pitchFamily="34" charset="0"/>
+                <a:ea typeface="Calibri" panose="020F0502020204030204" pitchFamily="34" charset="0"/>
+                <a:cs typeface="Times New Roman" panose="02020603050405020304" pitchFamily="18" charset="0"/>
+              </a:rPr>
+              <a:t>let the containers run like your host computer service? Sometimes, often not! No need to expose the ports, they are visible in the host like any service on host computer.</a:t>
+            </a:r>
+          </a:p>
+          <a:p>
+            <a:pPr>
+              <a:lnSpc>
+                <a:spcPct val="107000"/>
+              </a:lnSpc>
+              <a:spcAft>
+                <a:spcPts val="800"/>
+              </a:spcAft>
+            </a:pPr>
+            <a:r>
+              <a:rPr lang="en-US" sz="1800" b="1" dirty="0">
+                <a:effectLst/>
+                <a:highlight>
+                  <a:srgbClr val="00FF00"/>
+                </a:highlight>
+                <a:latin typeface="Calibri" panose="020F0502020204030204" pitchFamily="34" charset="0"/>
+                <a:ea typeface="Calibri" panose="020F0502020204030204" pitchFamily="34" charset="0"/>
+                <a:cs typeface="Times New Roman" panose="02020603050405020304" pitchFamily="18" charset="0"/>
+              </a:rPr>
+              <a:t>iv) None</a:t>
+            </a:r>
+            <a:r>
+              <a:rPr lang="en-US" sz="1800" dirty="0">
+                <a:effectLst/>
+                <a:latin typeface="Calibri" panose="020F0502020204030204" pitchFamily="34" charset="0"/>
+                <a:ea typeface="Calibri" panose="020F0502020204030204" pitchFamily="34" charset="0"/>
+                <a:cs typeface="Times New Roman" panose="02020603050405020304" pitchFamily="18" charset="0"/>
+              </a:rPr>
+              <a:t> = total isolation</a:t>
+            </a:r>
+          </a:p>
+          <a:p>
+            <a:pPr>
+              <a:lnSpc>
+                <a:spcPct val="107000"/>
+              </a:lnSpc>
+              <a:spcAft>
+                <a:spcPts val="800"/>
+              </a:spcAft>
+            </a:pPr>
+            <a:r>
+              <a:rPr lang="en-US" dirty="0">
+                <a:latin typeface="Calibri" panose="020F0502020204030204" pitchFamily="34" charset="0"/>
+                <a:ea typeface="Calibri" panose="020F0502020204030204" pitchFamily="34" charset="0"/>
+                <a:cs typeface="Times New Roman" panose="02020603050405020304" pitchFamily="18" charset="0"/>
+              </a:rPr>
+              <a:t>Etc. (There are others, but then we start to go to so complicated ‘server farms’ that better add Kubernetes too)</a:t>
+            </a:r>
+            <a:endParaRPr lang="en-US" sz="1800" dirty="0">
+              <a:effectLst/>
+              <a:latin typeface="Calibri" panose="020F0502020204030204" pitchFamily="34" charset="0"/>
+              <a:ea typeface="Calibri" panose="020F0502020204030204" pitchFamily="34" charset="0"/>
+              <a:cs typeface="Times New Roman" panose="02020603050405020304" pitchFamily="18" charset="0"/>
+            </a:endParaRPr>
+          </a:p>
+          <a:p>
             <a:endParaRPr lang="fi-FI" dirty="0"/>
           </a:p>
         </p:txBody>
       </p:sp>
-      <p:pic>
-        <p:nvPicPr>
-          <p:cNvPr id="9" name="Content Placeholder 8" descr="A diagram of a network&#10;&#10;Description automatically generated">
-            <a:extLst>
-              <a:ext uri="{FF2B5EF4-FFF2-40B4-BE49-F238E27FC236}">
-                <a16:creationId xmlns:a16="http://schemas.microsoft.com/office/drawing/2014/main" id="{4F3C2D7E-9E75-70A9-50A0-3967F4715B4D}"/>
-              </a:ext>
-            </a:extLst>
-          </p:cNvPr>
-          <p:cNvPicPr>
-            <a:picLocks noGrp="1" noChangeAspect="1"/>
-          </p:cNvPicPr>
-          <p:nvPr>
-            <p:ph sz="half" idx="2"/>
-          </p:nvPr>
-        </p:nvPicPr>
-        <p:blipFill>
-          <a:blip r:embed="rId2"/>
-          <a:stretch>
-            <a:fillRect/>
-          </a:stretch>
-        </p:blipFill>
-        <p:spPr>
-          <a:xfrm>
-            <a:off x="2764145" y="780836"/>
-            <a:ext cx="9347163" cy="4376791"/>
-          </a:xfrm>
-        </p:spPr>
-      </p:pic>
+      <p:sp>
+        <p:nvSpPr>
+          <p:cNvPr id="5" name="Date Placeholder 4">
+            <a:extLst>
+              <a:ext uri="{FF2B5EF4-FFF2-40B4-BE49-F238E27FC236}">
+                <a16:creationId xmlns:a16="http://schemas.microsoft.com/office/drawing/2014/main" id="{976244E2-AA76-2742-B2EC-FEC79276155C}"/>
+              </a:ext>
+            </a:extLst>
+          </p:cNvPr>
+          <p:cNvSpPr>
+            <a:spLocks noGrp="1"/>
+          </p:cNvSpPr>
+          <p:nvPr>
+            <p:ph type="dt" sz="half" idx="10"/>
+          </p:nvPr>
+        </p:nvSpPr>
+        <p:spPr/>
+        <p:txBody>
+          <a:bodyPr/>
+          <a:lstStyle/>
+          <a:p>
+            <a:fld id="{202E1EC2-47B8-044B-A09E-6A63B4D80C87}" type="datetime1">
+              <a:rPr lang="fi-FI" smtClean="0"/>
+              <a:t>18.2.2024</a:t>
+            </a:fld>
+            <a:endParaRPr lang="en-GB"/>
+          </a:p>
+        </p:txBody>
+      </p:sp>
+      <p:sp>
+        <p:nvSpPr>
+          <p:cNvPr id="6" name="Footer Placeholder 5">
+            <a:extLst>
+              <a:ext uri="{FF2B5EF4-FFF2-40B4-BE49-F238E27FC236}">
+                <a16:creationId xmlns:a16="http://schemas.microsoft.com/office/drawing/2014/main" id="{588CE607-4137-8840-8FEA-42EAC857E3A3}"/>
+              </a:ext>
+            </a:extLst>
+          </p:cNvPr>
+          <p:cNvSpPr>
+            <a:spLocks noGrp="1"/>
+          </p:cNvSpPr>
+          <p:nvPr>
+            <p:ph type="ftr" sz="quarter" idx="11"/>
+          </p:nvPr>
+        </p:nvSpPr>
+        <p:spPr/>
+        <p:txBody>
+          <a:bodyPr/>
+          <a:lstStyle/>
+          <a:p>
+            <a:endParaRPr lang="en-GB"/>
+          </a:p>
+        </p:txBody>
+      </p:sp>
+      <p:sp>
+        <p:nvSpPr>
+          <p:cNvPr id="7" name="Slide Number Placeholder 6">
+            <a:extLst>
+              <a:ext uri="{FF2B5EF4-FFF2-40B4-BE49-F238E27FC236}">
+                <a16:creationId xmlns:a16="http://schemas.microsoft.com/office/drawing/2014/main" id="{2E133A96-6C73-0844-B8CB-27C2B5F4CFB1}"/>
+              </a:ext>
+            </a:extLst>
+          </p:cNvPr>
+          <p:cNvSpPr>
+            <a:spLocks noGrp="1"/>
+          </p:cNvSpPr>
+          <p:nvPr>
+            <p:ph type="sldNum" sz="quarter" idx="12"/>
+          </p:nvPr>
+        </p:nvSpPr>
+        <p:spPr/>
+        <p:txBody>
+          <a:bodyPr/>
+          <a:lstStyle/>
+          <a:p>
+            <a:fld id="{76BAB7ED-EDE9-4D4B-9A2D-30E18C47C16E}" type="slidenum">
+              <a:rPr lang="en-GB" smtClean="0"/>
+              <a:t>16</a:t>
+            </a:fld>
+            <a:endParaRPr lang="en-GB"/>
+          </a:p>
+        </p:txBody>
+      </p:sp>
     </p:spTree>
     <p:extLst>
       <p:ext uri="{BB962C8B-B14F-4D97-AF65-F5344CB8AC3E}">
-        <p14:creationId xmlns:p14="http://schemas.microsoft.com/office/powerpoint/2010/main" val="1042671776"/>
+        <p14:creationId xmlns:p14="http://schemas.microsoft.com/office/powerpoint/2010/main" val="3362218849"/>
       </p:ext>
     </p:extLst>
   </p:cSld>
@@ -8853,6 +9018,253 @@
           <p:cNvPr id="8" name="Title 7">
             <a:extLst>
               <a:ext uri="{FF2B5EF4-FFF2-40B4-BE49-F238E27FC236}">
+                <a16:creationId xmlns:a16="http://schemas.microsoft.com/office/drawing/2014/main" id="{197044C3-CD23-D844-B780-26FABA91AD0F}"/>
+              </a:ext>
+            </a:extLst>
+          </p:cNvPr>
+          <p:cNvSpPr>
+            <a:spLocks noGrp="1"/>
+          </p:cNvSpPr>
+          <p:nvPr>
+            <p:ph type="title"/>
+          </p:nvPr>
+        </p:nvSpPr>
+        <p:spPr/>
+        <p:txBody>
+          <a:bodyPr/>
+          <a:lstStyle/>
+          <a:p>
+            <a:r>
+              <a:rPr lang="fi-FI" dirty="0" err="1"/>
+              <a:t>network</a:t>
+            </a:r>
+            <a:endParaRPr lang="fi-FI" dirty="0"/>
+          </a:p>
+        </p:txBody>
+      </p:sp>
+      <p:sp>
+        <p:nvSpPr>
+          <p:cNvPr id="5" name="Date Placeholder 4">
+            <a:extLst>
+              <a:ext uri="{FF2B5EF4-FFF2-40B4-BE49-F238E27FC236}">
+                <a16:creationId xmlns:a16="http://schemas.microsoft.com/office/drawing/2014/main" id="{976244E2-AA76-2742-B2EC-FEC79276155C}"/>
+              </a:ext>
+            </a:extLst>
+          </p:cNvPr>
+          <p:cNvSpPr>
+            <a:spLocks noGrp="1"/>
+          </p:cNvSpPr>
+          <p:nvPr>
+            <p:ph type="dt" sz="half" idx="10"/>
+          </p:nvPr>
+        </p:nvSpPr>
+        <p:spPr/>
+        <p:txBody>
+          <a:bodyPr/>
+          <a:lstStyle/>
+          <a:p>
+            <a:fld id="{202E1EC2-47B8-044B-A09E-6A63B4D80C87}" type="datetime1">
+              <a:rPr lang="fi-FI" smtClean="0"/>
+              <a:t>18.2.2024</a:t>
+            </a:fld>
+            <a:endParaRPr lang="en-GB"/>
+          </a:p>
+        </p:txBody>
+      </p:sp>
+      <p:sp>
+        <p:nvSpPr>
+          <p:cNvPr id="6" name="Footer Placeholder 5">
+            <a:extLst>
+              <a:ext uri="{FF2B5EF4-FFF2-40B4-BE49-F238E27FC236}">
+                <a16:creationId xmlns:a16="http://schemas.microsoft.com/office/drawing/2014/main" id="{588CE607-4137-8840-8FEA-42EAC857E3A3}"/>
+              </a:ext>
+            </a:extLst>
+          </p:cNvPr>
+          <p:cNvSpPr>
+            <a:spLocks noGrp="1"/>
+          </p:cNvSpPr>
+          <p:nvPr>
+            <p:ph type="ftr" sz="quarter" idx="11"/>
+          </p:nvPr>
+        </p:nvSpPr>
+        <p:spPr/>
+        <p:txBody>
+          <a:bodyPr/>
+          <a:lstStyle/>
+          <a:p>
+            <a:endParaRPr lang="en-GB"/>
+          </a:p>
+        </p:txBody>
+      </p:sp>
+      <p:sp>
+        <p:nvSpPr>
+          <p:cNvPr id="7" name="Slide Number Placeholder 6">
+            <a:extLst>
+              <a:ext uri="{FF2B5EF4-FFF2-40B4-BE49-F238E27FC236}">
+                <a16:creationId xmlns:a16="http://schemas.microsoft.com/office/drawing/2014/main" id="{2E133A96-6C73-0844-B8CB-27C2B5F4CFB1}"/>
+              </a:ext>
+            </a:extLst>
+          </p:cNvPr>
+          <p:cNvSpPr>
+            <a:spLocks noGrp="1"/>
+          </p:cNvSpPr>
+          <p:nvPr>
+            <p:ph type="sldNum" sz="quarter" idx="12"/>
+          </p:nvPr>
+        </p:nvSpPr>
+        <p:spPr/>
+        <p:txBody>
+          <a:bodyPr/>
+          <a:lstStyle/>
+          <a:p>
+            <a:fld id="{76BAB7ED-EDE9-4D4B-9A2D-30E18C47C16E}" type="slidenum">
+              <a:rPr lang="en-GB" smtClean="0"/>
+              <a:t>17</a:t>
+            </a:fld>
+            <a:endParaRPr lang="en-GB"/>
+          </a:p>
+        </p:txBody>
+      </p:sp>
+      <p:pic>
+        <p:nvPicPr>
+          <p:cNvPr id="9" name="Content Placeholder 8" descr="A diagram of a network&#10;&#10;Description automatically generated">
+            <a:extLst>
+              <a:ext uri="{FF2B5EF4-FFF2-40B4-BE49-F238E27FC236}">
+                <a16:creationId xmlns:a16="http://schemas.microsoft.com/office/drawing/2014/main" id="{4F3C2D7E-9E75-70A9-50A0-3967F4715B4D}"/>
+              </a:ext>
+            </a:extLst>
+          </p:cNvPr>
+          <p:cNvPicPr>
+            <a:picLocks noGrp="1" noChangeAspect="1"/>
+          </p:cNvPicPr>
+          <p:nvPr>
+            <p:ph sz="half" idx="2"/>
+          </p:nvPr>
+        </p:nvPicPr>
+        <p:blipFill>
+          <a:blip r:embed="rId2"/>
+          <a:stretch>
+            <a:fillRect/>
+          </a:stretch>
+        </p:blipFill>
+        <p:spPr>
+          <a:xfrm>
+            <a:off x="2764145" y="780836"/>
+            <a:ext cx="9347163" cy="4376791"/>
+          </a:xfrm>
+        </p:spPr>
+      </p:pic>
+      <p:sp>
+        <p:nvSpPr>
+          <p:cNvPr id="12" name="TextBox 11">
+            <a:extLst>
+              <a:ext uri="{FF2B5EF4-FFF2-40B4-BE49-F238E27FC236}">
+                <a16:creationId xmlns:a16="http://schemas.microsoft.com/office/drawing/2014/main" id="{F9375A48-11BB-EBB6-6A50-95AB866A6567}"/>
+              </a:ext>
+            </a:extLst>
+          </p:cNvPr>
+          <p:cNvSpPr txBox="1"/>
+          <p:nvPr/>
+        </p:nvSpPr>
+        <p:spPr>
+          <a:xfrm>
+            <a:off x="360851" y="4154306"/>
+            <a:ext cx="3131921" cy="1477328"/>
+          </a:xfrm>
+          <a:prstGeom prst="rect">
+            <a:avLst/>
+          </a:prstGeom>
+          <a:noFill/>
+        </p:spPr>
+        <p:txBody>
+          <a:bodyPr wrap="square">
+            <a:spAutoFit/>
+          </a:bodyPr>
+          <a:lstStyle/>
+          <a:p>
+            <a:r>
+              <a:rPr lang="en-US" sz="1800" dirty="0">
+                <a:effectLst/>
+                <a:latin typeface="Calibri" panose="020F0502020204030204" pitchFamily="34" charset="0"/>
+                <a:ea typeface="Calibri" panose="020F0502020204030204" pitchFamily="34" charset="0"/>
+                <a:cs typeface="Times New Roman" panose="02020603050405020304" pitchFamily="18" charset="0"/>
+              </a:rPr>
+              <a:t>Here two user-defined bridge</a:t>
+            </a:r>
+          </a:p>
+          <a:p>
+            <a:r>
+              <a:rPr lang="en-US" dirty="0">
+                <a:latin typeface="Calibri" panose="020F0502020204030204" pitchFamily="34" charset="0"/>
+                <a:ea typeface="Calibri" panose="020F0502020204030204" pitchFamily="34" charset="0"/>
+                <a:cs typeface="Times New Roman" panose="02020603050405020304" pitchFamily="18" charset="0"/>
+              </a:rPr>
+              <a:t>networks</a:t>
+            </a:r>
+            <a:endParaRPr lang="en-US" sz="1800" dirty="0">
+              <a:effectLst/>
+              <a:latin typeface="Calibri" panose="020F0502020204030204" pitchFamily="34" charset="0"/>
+              <a:ea typeface="Calibri" panose="020F0502020204030204" pitchFamily="34" charset="0"/>
+              <a:cs typeface="Times New Roman" panose="02020603050405020304" pitchFamily="18" charset="0"/>
+            </a:endParaRPr>
+          </a:p>
+          <a:p>
+            <a:endParaRPr lang="en-US" sz="1800" dirty="0">
+              <a:effectLst/>
+              <a:latin typeface="Calibri" panose="020F0502020204030204" pitchFamily="34" charset="0"/>
+              <a:ea typeface="Calibri" panose="020F0502020204030204" pitchFamily="34" charset="0"/>
+              <a:cs typeface="Times New Roman" panose="02020603050405020304" pitchFamily="18" charset="0"/>
+            </a:endParaRPr>
+          </a:p>
+          <a:p>
+            <a:r>
+              <a:rPr lang="en-US" sz="1800" dirty="0">
+                <a:effectLst/>
+                <a:latin typeface="Calibri" panose="020F0502020204030204" pitchFamily="34" charset="0"/>
+                <a:ea typeface="Calibri" panose="020F0502020204030204" pitchFamily="34" charset="0"/>
+                <a:cs typeface="Times New Roman" panose="02020603050405020304" pitchFamily="18" charset="0"/>
+              </a:rPr>
+              <a:t>Source: https://docs.docker.com</a:t>
+            </a:r>
+            <a:endParaRPr lang="fi-FI" dirty="0"/>
+          </a:p>
+        </p:txBody>
+      </p:sp>
+    </p:spTree>
+    <p:extLst>
+      <p:ext uri="{BB962C8B-B14F-4D97-AF65-F5344CB8AC3E}">
+        <p14:creationId xmlns:p14="http://schemas.microsoft.com/office/powerpoint/2010/main" val="1042671776"/>
+      </p:ext>
+    </p:extLst>
+  </p:cSld>
+  <p:clrMapOvr>
+    <a:masterClrMapping/>
+  </p:clrMapOvr>
+</p:sld>
+</file>
+
+<file path=ppt/slides/slide18.xml><?xml version="1.0" encoding="utf-8"?>
+<p:sld xmlns:a="http://schemas.openxmlformats.org/drawingml/2006/main" xmlns:r="http://schemas.openxmlformats.org/officeDocument/2006/relationships" xmlns:p="http://schemas.openxmlformats.org/presentationml/2006/main">
+  <p:cSld>
+    <p:spTree>
+      <p:nvGrpSpPr>
+        <p:cNvPr id="1" name=""/>
+        <p:cNvGrpSpPr/>
+        <p:nvPr/>
+      </p:nvGrpSpPr>
+      <p:grpSpPr>
+        <a:xfrm>
+          <a:off x="0" y="0"/>
+          <a:ext cx="0" cy="0"/>
+          <a:chOff x="0" y="0"/>
+          <a:chExt cx="0" cy="0"/>
+        </a:xfrm>
+      </p:grpSpPr>
+      <p:sp>
+        <p:nvSpPr>
+          <p:cNvPr id="8" name="Title 7">
+            <a:extLst>
+              <a:ext uri="{FF2B5EF4-FFF2-40B4-BE49-F238E27FC236}">
                 <a16:creationId xmlns:a16="http://schemas.microsoft.com/office/drawing/2014/main" id="{49202545-D26B-485C-9E25-62859E92ED89}"/>
               </a:ext>
             </a:extLst>
@@ -9014,7 +9426,7 @@
           <a:p>
             <a:fld id="{7A2E22EC-FB8F-BE4C-8513-60D11DB7758C}" type="datetime1">
               <a:rPr lang="fi-FI" smtClean="0"/>
-              <a:t>25.1.2024</a:t>
+              <a:t>18.2.2024</a:t>
             </a:fld>
             <a:endParaRPr lang="en-GB"/>
           </a:p>
@@ -9068,7 +9480,7 @@
           <a:p>
             <a:fld id="{76BAB7ED-EDE9-4D4B-9A2D-30E18C47C16E}" type="slidenum">
               <a:rPr lang="en-GB" smtClean="0"/>
-              <a:t>17</a:t>
+              <a:t>18</a:t>
             </a:fld>
             <a:endParaRPr lang="en-GB"/>
           </a:p>
@@ -9172,7 +9584,7 @@
                 <a:ea typeface="Calibri" panose="020F0502020204030204" pitchFamily="34" charset="0"/>
                 <a:cs typeface="Times New Roman" panose="02020603050405020304" pitchFamily="18" charset="0"/>
               </a:rPr>
-              <a:t>PaaS environment </a:t>
+              <a:t>(PaaS) environment </a:t>
             </a:r>
             <a:r>
               <a:rPr lang="en-US" sz="2800" dirty="0">
@@ -9363,7 +9775,7 @@
           <a:p>
             <a:fld id="{202E1EC2-47B8-044B-A09E-6A63B4D80C87}" type="datetime1">
               <a:rPr lang="fi-FI" smtClean="0"/>
-              <a:t>25.1.2024</a:t>
+              <a:t>18.2.2024</a:t>
             </a:fld>
             <a:endParaRPr lang="en-GB"/>
           </a:p>
@@ -9521,7 +9933,7 @@
           <a:p>
             <a:fld id="{202E1EC2-47B8-044B-A09E-6A63B4D80C87}" type="datetime1">
               <a:rPr lang="fi-FI" smtClean="0"/>
-              <a:t>25.1.2024</a:t>
+              <a:t>18.2.2024</a:t>
             </a:fld>
             <a:endParaRPr lang="en-GB"/>
           </a:p>
@@ -9749,7 +10161,7 @@
           <a:p>
             <a:fld id="{202E1EC2-47B8-044B-A09E-6A63B4D80C87}" type="datetime1">
               <a:rPr lang="fi-FI" smtClean="0"/>
-              <a:t>25.1.2024</a:t>
+              <a:t>18.2.2024</a:t>
             </a:fld>
             <a:endParaRPr lang="en-GB"/>
           </a:p>
@@ -9932,11 +10344,43 @@
           <a:p>
             <a:r>
               <a:rPr lang="fi-FI" dirty="0" err="1"/>
-              <a:t>Docker</a:t>
+              <a:t>Previous</a:t>
             </a:r>
             <a:r>
               <a:rPr lang="fi-FI" dirty="0"/>
-              <a:t> Engine</a:t>
+              <a:t> image </a:t>
+            </a:r>
+            <a:r>
+              <a:rPr lang="fi-FI" dirty="0" err="1"/>
+              <a:t>showed</a:t>
+            </a:r>
+            <a:r>
+              <a:rPr lang="fi-FI" dirty="0"/>
+              <a:t> </a:t>
+            </a:r>
+            <a:r>
+              <a:rPr lang="fi-FI" dirty="0" err="1"/>
+              <a:t>how</a:t>
+            </a:r>
+            <a:r>
+              <a:rPr lang="fi-FI" dirty="0"/>
+              <a:t> </a:t>
+            </a:r>
+            <a:r>
+              <a:rPr lang="fi-FI" dirty="0" err="1"/>
+              <a:t>you</a:t>
+            </a:r>
+            <a:r>
+              <a:rPr lang="fi-FI" dirty="0"/>
+              <a:t> </a:t>
+            </a:r>
+            <a:r>
+              <a:rPr lang="fi-FI" dirty="0" err="1"/>
+              <a:t>can</a:t>
+            </a:r>
+            <a:r>
+              <a:rPr lang="fi-FI" dirty="0"/>
+              <a:t> e.g.</a:t>
             </a:r>
           </a:p>
         </p:txBody>
@@ -9979,25 +10423,7 @@
                 <a:ea typeface="Calibri" panose="020F0502020204030204" pitchFamily="34" charset="0"/>
                 <a:cs typeface="Times New Roman" panose="02020603050405020304" pitchFamily="18" charset="0"/>
               </a:rPr>
-              <a:t>The engine (</a:t>
-            </a:r>
-            <a:r>
-              <a:rPr lang="en-US" sz="2800" i="1" dirty="0" err="1">
-                <a:effectLst/>
-                <a:latin typeface="Calibri" panose="020F0502020204030204" pitchFamily="34" charset="0"/>
-                <a:ea typeface="Calibri" panose="020F0502020204030204" pitchFamily="34" charset="0"/>
-                <a:cs typeface="Times New Roman" panose="02020603050405020304" pitchFamily="18" charset="0"/>
-              </a:rPr>
-              <a:t>dockerd</a:t>
-            </a:r>
-            <a:r>
-              <a:rPr lang="en-US" sz="2800" dirty="0">
-                <a:effectLst/>
-                <a:latin typeface="Calibri" panose="020F0502020204030204" pitchFamily="34" charset="0"/>
-                <a:ea typeface="Calibri" panose="020F0502020204030204" pitchFamily="34" charset="0"/>
-                <a:cs typeface="Times New Roman" panose="02020603050405020304" pitchFamily="18" charset="0"/>
-              </a:rPr>
-              <a:t> daemon/process and Docker Engine API ) </a:t>
+              <a:t>Run images as containers </a:t>
             </a:r>
           </a:p>
           <a:p>
@@ -10015,17 +10441,22 @@
                 <a:ea typeface="Calibri" panose="020F0502020204030204" pitchFamily="34" charset="0"/>
                 <a:cs typeface="Times New Roman" panose="02020603050405020304" pitchFamily="18" charset="0"/>
               </a:rPr>
-              <a:t>T</a:t>
-            </a:r>
-            <a:r>
-              <a:rPr lang="en-US" sz="2800" dirty="0">
-                <a:effectLst/>
+              <a:t>Build images based on your files, scripts and </a:t>
+            </a:r>
+            <a:r>
+              <a:rPr lang="en-US" sz="2800" dirty="0" err="1">
                 <a:latin typeface="Calibri" panose="020F0502020204030204" pitchFamily="34" charset="0"/>
                 <a:ea typeface="Calibri" panose="020F0502020204030204" pitchFamily="34" charset="0"/>
                 <a:cs typeface="Times New Roman" panose="02020603050405020304" pitchFamily="18" charset="0"/>
               </a:rPr>
-              <a:t>o manage and run the containers.</a:t>
-            </a:r>
+              <a:t>Dockerfiles</a:t>
+            </a:r>
+            <a:endParaRPr lang="en-US" sz="2800" dirty="0">
+              <a:effectLst/>
+              <a:latin typeface="Calibri" panose="020F0502020204030204" pitchFamily="34" charset="0"/>
+              <a:ea typeface="Calibri" panose="020F0502020204030204" pitchFamily="34" charset="0"/>
+              <a:cs typeface="Times New Roman" panose="02020603050405020304" pitchFamily="18" charset="0"/>
+            </a:endParaRPr>
           </a:p>
           <a:p>
             <a:pPr>
@@ -10042,7 +10473,7 @@
                 <a:ea typeface="Calibri" panose="020F0502020204030204" pitchFamily="34" charset="0"/>
                 <a:cs typeface="Times New Roman" panose="02020603050405020304" pitchFamily="18" charset="0"/>
               </a:rPr>
-              <a:t>Isolate and connect them based on definitions</a:t>
+              <a:t>Pull images (for running) from Docker registries</a:t>
             </a:r>
           </a:p>
         </p:txBody>
@@ -10070,7 +10501,7 @@
           <a:p>
             <a:fld id="{202E1EC2-47B8-044B-A09E-6A63B4D80C87}" type="datetime1">
               <a:rPr lang="fi-FI" smtClean="0"/>
-              <a:t>25.1.2024</a:t>
+              <a:t>18.2.2024</a:t>
             </a:fld>
             <a:endParaRPr lang="en-GB"/>
           </a:p>
@@ -10183,19 +10614,11 @@
           <a:p>
             <a:r>
               <a:rPr lang="fi-FI" dirty="0" err="1"/>
-              <a:t>docker</a:t>
+              <a:t>Docker</a:t>
             </a:r>
             <a:r>
               <a:rPr lang="fi-FI" dirty="0"/>
-              <a:t>  (CLI </a:t>
-            </a:r>
-            <a:r>
-              <a:rPr lang="fi-FI" dirty="0" err="1"/>
-              <a:t>command</a:t>
-            </a:r>
-            <a:r>
-              <a:rPr lang="fi-FI" dirty="0"/>
-              <a:t>)</a:t>
+              <a:t> Engine</a:t>
             </a:r>
           </a:p>
         </p:txBody>
@@ -10232,31 +10655,31 @@
               </a:spcAft>
             </a:pPr>
             <a:r>
-              <a:rPr lang="en-US" sz="1800" dirty="0">
+              <a:rPr lang="en-US" sz="2800" dirty="0">
                 <a:effectLst/>
                 <a:latin typeface="Calibri" panose="020F0502020204030204" pitchFamily="34" charset="0"/>
                 <a:ea typeface="Calibri" panose="020F0502020204030204" pitchFamily="34" charset="0"/>
                 <a:cs typeface="Times New Roman" panose="02020603050405020304" pitchFamily="18" charset="0"/>
               </a:rPr>
-              <a:t>The </a:t>
-            </a:r>
-            <a:r>
-              <a:rPr lang="en-US" sz="1800" i="1" dirty="0">
+              <a:t>The engine (</a:t>
+            </a:r>
+            <a:r>
+              <a:rPr lang="en-US" sz="2800" i="1" dirty="0" err="1">
                 <a:effectLst/>
                 <a:latin typeface="Calibri" panose="020F0502020204030204" pitchFamily="34" charset="0"/>
                 <a:ea typeface="Calibri" panose="020F0502020204030204" pitchFamily="34" charset="0"/>
                 <a:cs typeface="Times New Roman" panose="02020603050405020304" pitchFamily="18" charset="0"/>
               </a:rPr>
-              <a:t>docker</a:t>
-            </a:r>
-            <a:r>
-              <a:rPr lang="en-US" sz="1800" dirty="0">
+              <a:t>dockerd</a:t>
+            </a:r>
+            <a:r>
+              <a:rPr lang="en-US" sz="2800" dirty="0">
                 <a:effectLst/>
                 <a:latin typeface="Calibri" panose="020F0502020204030204" pitchFamily="34" charset="0"/>
                 <a:ea typeface="Calibri" panose="020F0502020204030204" pitchFamily="34" charset="0"/>
                 <a:cs typeface="Times New Roman" panose="02020603050405020304" pitchFamily="18" charset="0"/>
               </a:rPr>
-              <a:t> command line command. </a:t>
+              <a:t> daemon/process and Docker Engine API ) </a:t>
             </a:r>
           </a:p>
           <a:p>
@@ -10269,83 +10692,21 @@
               </a:spcAft>
             </a:pPr>
             <a:r>
-              <a:rPr lang="en-US" sz="1800" dirty="0">
+              <a:rPr lang="en-US" sz="2800" dirty="0">
+                <a:latin typeface="Calibri" panose="020F0502020204030204" pitchFamily="34" charset="0"/>
+                <a:ea typeface="Calibri" panose="020F0502020204030204" pitchFamily="34" charset="0"/>
+                <a:cs typeface="Times New Roman" panose="02020603050405020304" pitchFamily="18" charset="0"/>
+              </a:rPr>
+              <a:t>T</a:t>
+            </a:r>
+            <a:r>
+              <a:rPr lang="en-US" sz="2800" dirty="0">
                 <a:effectLst/>
                 <a:latin typeface="Calibri" panose="020F0502020204030204" pitchFamily="34" charset="0"/>
                 <a:ea typeface="Calibri" panose="020F0502020204030204" pitchFamily="34" charset="0"/>
                 <a:cs typeface="Times New Roman" panose="02020603050405020304" pitchFamily="18" charset="0"/>
               </a:rPr>
-              <a:t>Client for giving commands e.g. about </a:t>
-            </a:r>
-          </a:p>
-          <a:p>
-            <a:pPr lvl="1">
-              <a:lnSpc>
-                <a:spcPct val="107000"/>
-              </a:lnSpc>
-              <a:spcAft>
-                <a:spcPts val="800"/>
-              </a:spcAft>
-            </a:pPr>
-            <a:r>
-              <a:rPr lang="en-US" dirty="0">
-                <a:effectLst/>
-                <a:latin typeface="Calibri" panose="020F0502020204030204" pitchFamily="34" charset="0"/>
-                <a:ea typeface="Calibri" panose="020F0502020204030204" pitchFamily="34" charset="0"/>
-                <a:cs typeface="Times New Roman" panose="02020603050405020304" pitchFamily="18" charset="0"/>
-              </a:rPr>
-              <a:t>starting or stopping containers, removing containers </a:t>
-            </a:r>
-            <a:endParaRPr lang="en-US" dirty="0">
-              <a:latin typeface="Calibri" panose="020F0502020204030204" pitchFamily="34" charset="0"/>
-              <a:ea typeface="Calibri" panose="020F0502020204030204" pitchFamily="34" charset="0"/>
-              <a:cs typeface="Times New Roman" panose="02020603050405020304" pitchFamily="18" charset="0"/>
-            </a:endParaRPr>
-          </a:p>
-          <a:p>
-            <a:pPr lvl="1">
-              <a:lnSpc>
-                <a:spcPct val="107000"/>
-              </a:lnSpc>
-              <a:spcAft>
-                <a:spcPts val="800"/>
-              </a:spcAft>
-            </a:pPr>
-            <a:r>
-              <a:rPr lang="en-US" dirty="0">
-                <a:effectLst/>
-                <a:latin typeface="Calibri" panose="020F0502020204030204" pitchFamily="34" charset="0"/>
-                <a:ea typeface="Calibri" panose="020F0502020204030204" pitchFamily="34" charset="0"/>
-                <a:cs typeface="Times New Roman" panose="02020603050405020304" pitchFamily="18" charset="0"/>
-              </a:rPr>
-              <a:t>building, publishing images, removing images</a:t>
-            </a:r>
-          </a:p>
-          <a:p>
-            <a:pPr lvl="1">
-              <a:lnSpc>
-                <a:spcPct val="107000"/>
-              </a:lnSpc>
-              <a:spcAft>
-                <a:spcPts val="800"/>
-              </a:spcAft>
-            </a:pPr>
-            <a:r>
-              <a:rPr lang="en-US" dirty="0">
-                <a:latin typeface="Calibri" panose="020F0502020204030204" pitchFamily="34" charset="0"/>
-                <a:ea typeface="Calibri" panose="020F0502020204030204" pitchFamily="34" charset="0"/>
-                <a:cs typeface="Times New Roman" panose="02020603050405020304" pitchFamily="18" charset="0"/>
-              </a:rPr>
-              <a:t>f</a:t>
-            </a:r>
-            <a:r>
-              <a:rPr lang="en-US" dirty="0">
-                <a:effectLst/>
-                <a:latin typeface="Calibri" panose="020F0502020204030204" pitchFamily="34" charset="0"/>
-                <a:ea typeface="Calibri" panose="020F0502020204030204" pitchFamily="34" charset="0"/>
-                <a:cs typeface="Times New Roman" panose="02020603050405020304" pitchFamily="18" charset="0"/>
-              </a:rPr>
-              <a:t>inding status of containers and images</a:t>
+              <a:t>o manage and run the containers.</a:t>
             </a:r>
           </a:p>
           <a:p>
@@ -10358,19 +10719,13 @@
               </a:spcAft>
             </a:pPr>
             <a:r>
-              <a:rPr lang="en-US" dirty="0">
+              <a:rPr lang="en-US" sz="2800" dirty="0">
                 <a:latin typeface="Calibri" panose="020F0502020204030204" pitchFamily="34" charset="0"/>
                 <a:ea typeface="Calibri" panose="020F0502020204030204" pitchFamily="34" charset="0"/>
                 <a:cs typeface="Times New Roman" panose="02020603050405020304" pitchFamily="18" charset="0"/>
               </a:rPr>
-              <a:t>Or executing commands inside the container from outside:         docker exec …</a:t>
-            </a:r>
-            <a:endParaRPr lang="fi-FI" sz="1800" dirty="0">
-              <a:effectLst/>
-              <a:latin typeface="Calibri" panose="020F0502020204030204" pitchFamily="34" charset="0"/>
-              <a:ea typeface="Calibri" panose="020F0502020204030204" pitchFamily="34" charset="0"/>
-              <a:cs typeface="Times New Roman" panose="02020603050405020304" pitchFamily="18" charset="0"/>
-            </a:endParaRPr>
+              <a:t>Isolate and connect them based on definitions</a:t>
+            </a:r>
           </a:p>
         </p:txBody>
       </p:sp>
@@ -10397,7 +10752,7 @@
           <a:p>
             <a:fld id="{202E1EC2-47B8-044B-A09E-6A63B4D80C87}" type="datetime1">
               <a:rPr lang="fi-FI" smtClean="0"/>
-              <a:t>25.1.2024</a:t>
+              <a:t>18.2.2024</a:t>
             </a:fld>
             <a:endParaRPr lang="en-GB"/>
           </a:p>
@@ -10460,7 +10815,7 @@
     </p:spTree>
     <p:extLst>
       <p:ext uri="{BB962C8B-B14F-4D97-AF65-F5344CB8AC3E}">
-        <p14:creationId xmlns:p14="http://schemas.microsoft.com/office/powerpoint/2010/main" val="528999108"/>
+        <p14:creationId xmlns:p14="http://schemas.microsoft.com/office/powerpoint/2010/main" val="2736095374"/>
       </p:ext>
     </p:extLst>
   </p:cSld>
@@ -10510,9 +10865,20 @@
           <a:p>
             <a:r>
               <a:rPr lang="fi-FI" dirty="0" err="1"/>
-              <a:t>Dockerfile</a:t>
-            </a:r>
-            <a:endParaRPr lang="fi-FI" dirty="0"/>
+              <a:t>docker</a:t>
+            </a:r>
+            <a:r>
+              <a:rPr lang="fi-FI" dirty="0"/>
+              <a:t>  (CLI </a:t>
+            </a:r>
+            <a:r>
+              <a:rPr lang="fi-FI" dirty="0" err="1"/>
+              <a:t>command</a:t>
+            </a:r>
+            <a:r>
+              <a:rPr lang="fi-FI" dirty="0"/>
+              <a:t>)</a:t>
+            </a:r>
           </a:p>
         </p:txBody>
       </p:sp>
@@ -10554,7 +10920,25 @@
                 <a:ea typeface="Calibri" panose="020F0502020204030204" pitchFamily="34" charset="0"/>
                 <a:cs typeface="Times New Roman" panose="02020603050405020304" pitchFamily="18" charset="0"/>
               </a:rPr>
-              <a:t>Your ‘script’ for making your own Docker images. </a:t>
+              <a:t>The </a:t>
+            </a:r>
+            <a:r>
+              <a:rPr lang="en-US" sz="1800" i="1" dirty="0">
+                <a:effectLst/>
+                <a:latin typeface="Calibri" panose="020F0502020204030204" pitchFamily="34" charset="0"/>
+                <a:ea typeface="Calibri" panose="020F0502020204030204" pitchFamily="34" charset="0"/>
+                <a:cs typeface="Times New Roman" panose="02020603050405020304" pitchFamily="18" charset="0"/>
+              </a:rPr>
+              <a:t>docker</a:t>
+            </a:r>
+            <a:r>
+              <a:rPr lang="en-US" sz="1800" dirty="0">
+                <a:effectLst/>
+                <a:latin typeface="Calibri" panose="020F0502020204030204" pitchFamily="34" charset="0"/>
+                <a:ea typeface="Calibri" panose="020F0502020204030204" pitchFamily="34" charset="0"/>
+                <a:cs typeface="Times New Roman" panose="02020603050405020304" pitchFamily="18" charset="0"/>
+              </a:rPr>
+              <a:t> command line command. </a:t>
             </a:r>
           </a:p>
           <a:p>
@@ -10573,7 +10957,7 @@
                 <a:ea typeface="Calibri" panose="020F0502020204030204" pitchFamily="34" charset="0"/>
                 <a:cs typeface="Times New Roman" panose="02020603050405020304" pitchFamily="18" charset="0"/>
               </a:rPr>
-              <a:t>Image could be built based on source code and other assets on your disk </a:t>
+              <a:t>Client for giving commands e.g. about </a:t>
             </a:r>
           </a:p>
           <a:p>
@@ -10592,17 +10976,23 @@
                 <a:ea typeface="Calibri" panose="020F0502020204030204" pitchFamily="34" charset="0"/>
                 <a:cs typeface="Times New Roman" panose="02020603050405020304" pitchFamily="18" charset="0"/>
               </a:rPr>
-              <a:t>and, if needed, based on / expanding on ready-made images from </a:t>
-            </a:r>
-            <a:r>
-              <a:rPr lang="en-US" i="1" dirty="0">
-                <a:effectLst/>
-                <a:latin typeface="Calibri" panose="020F0502020204030204" pitchFamily="34" charset="0"/>
-                <a:ea typeface="Calibri" panose="020F0502020204030204" pitchFamily="34" charset="0"/>
-                <a:cs typeface="Times New Roman" panose="02020603050405020304" pitchFamily="18" charset="0"/>
-              </a:rPr>
-              <a:t>Docker Hub</a:t>
-            </a:r>
+              <a:t>starting or stopping containers, removing containers </a:t>
+            </a:r>
+            <a:endParaRPr lang="en-US" dirty="0">
+              <a:latin typeface="Calibri" panose="020F0502020204030204" pitchFamily="34" charset="0"/>
+              <a:ea typeface="Calibri" panose="020F0502020204030204" pitchFamily="34" charset="0"/>
+              <a:cs typeface="Times New Roman" panose="02020603050405020304" pitchFamily="18" charset="0"/>
+            </a:endParaRPr>
+          </a:p>
+          <a:p>
+            <a:pPr lvl="1">
+              <a:lnSpc>
+                <a:spcPct val="107000"/>
+              </a:lnSpc>
+              <a:spcAft>
+                <a:spcPts val="800"/>
+              </a:spcAft>
+            </a:pPr>
             <a:r>
               <a:rPr lang="en-US" dirty="0">
                 <a:effectLst/>
@@ -10610,18 +11000,60 @@
                 <a:ea typeface="Calibri" panose="020F0502020204030204" pitchFamily="34" charset="0"/>
                 <a:cs typeface="Times New Roman" panose="02020603050405020304" pitchFamily="18" charset="0"/>
               </a:rPr>
-              <a:t> or other docker image registry.</a:t>
-            </a:r>
-            <a:endParaRPr lang="fi-FI" dirty="0">
+              <a:t>building, publishing images, removing images</a:t>
+            </a:r>
+          </a:p>
+          <a:p>
+            <a:pPr lvl="1">
+              <a:lnSpc>
+                <a:spcPct val="107000"/>
+              </a:lnSpc>
+              <a:spcAft>
+                <a:spcPts val="800"/>
+              </a:spcAft>
+            </a:pPr>
+            <a:r>
+              <a:rPr lang="en-US" dirty="0">
+                <a:latin typeface="Calibri" panose="020F0502020204030204" pitchFamily="34" charset="0"/>
+                <a:ea typeface="Calibri" panose="020F0502020204030204" pitchFamily="34" charset="0"/>
+                <a:cs typeface="Times New Roman" panose="02020603050405020304" pitchFamily="18" charset="0"/>
+              </a:rPr>
+              <a:t>f</a:t>
+            </a:r>
+            <a:r>
+              <a:rPr lang="en-US" dirty="0">
+                <a:effectLst/>
+                <a:latin typeface="Calibri" panose="020F0502020204030204" pitchFamily="34" charset="0"/>
+                <a:ea typeface="Calibri" panose="020F0502020204030204" pitchFamily="34" charset="0"/>
+                <a:cs typeface="Times New Roman" panose="02020603050405020304" pitchFamily="18" charset="0"/>
+              </a:rPr>
+              <a:t>inding status of containers and images</a:t>
+            </a:r>
+          </a:p>
+          <a:p>
+            <a:pPr>
+              <a:lnSpc>
+                <a:spcPct val="107000"/>
+              </a:lnSpc>
+              <a:spcAft>
+                <a:spcPts val="800"/>
+              </a:spcAft>
+            </a:pPr>
+            <a:r>
+              <a:rPr lang="en-US" dirty="0">
+                <a:latin typeface="Calibri" panose="020F0502020204030204" pitchFamily="34" charset="0"/>
+                <a:ea typeface="Calibri" panose="020F0502020204030204" pitchFamily="34" charset="0"/>
+                <a:cs typeface="Times New Roman" panose="02020603050405020304" pitchFamily="18" charset="0"/>
+              </a:rPr>
+              <a:t>Or executing commands inside the container from outside:         docker exec …</a:t>
+            </a:r>
+            <a:endParaRPr lang="fi-FI" sz="1800" dirty="0">
               <a:effectLst/>
               <a:latin typeface="Calibri" panose="020F0502020204030204" pitchFamily="34" charset="0"/>
               <a:ea typeface="Calibri" panose="020F0502020204030204" pitchFamily="34" charset="0"/>
               <a:cs typeface="Times New Roman" panose="02020603050405020304" pitchFamily="18" charset="0"/>
             </a:endParaRPr>
           </a:p>
-          <a:p>
-            <a:endParaRPr lang="fi-FI" dirty="0"/>
-          </a:p>
         </p:txBody>
       </p:sp>
       <p:sp>
@@ -10647,7 +11079,7 @@
           <a:p>
             <a:fld id="{202E1EC2-47B8-044B-A09E-6A63B4D80C87}" type="datetime1">
               <a:rPr lang="fi-FI" smtClean="0"/>
-              <a:t>25.1.2024</a:t>
+              <a:t>18.2.2024</a:t>
             </a:fld>
             <a:endParaRPr lang="en-GB"/>
           </a:p>
@@ -10710,7 +11142,7 @@
     </p:spTree>
     <p:extLst>
       <p:ext uri="{BB962C8B-B14F-4D97-AF65-F5344CB8AC3E}">
-        <p14:creationId xmlns:p14="http://schemas.microsoft.com/office/powerpoint/2010/main" val="1689429107"/>
+        <p14:creationId xmlns:p14="http://schemas.microsoft.com/office/powerpoint/2010/main" val="528999108"/>
       </p:ext>
     </p:extLst>
   </p:cSld>
@@ -10768,145 +11200,35 @@
       </p:sp>
       <p:sp>
         <p:nvSpPr>
-          <p:cNvPr id="5" name="Date Placeholder 4">
-            <a:extLst>
-              <a:ext uri="{FF2B5EF4-FFF2-40B4-BE49-F238E27FC236}">
-                <a16:creationId xmlns:a16="http://schemas.microsoft.com/office/drawing/2014/main" id="{976244E2-AA76-2742-B2EC-FEC79276155C}"/>
-              </a:ext>
-            </a:extLst>
-          </p:cNvPr>
-          <p:cNvSpPr>
-            <a:spLocks noGrp="1"/>
-          </p:cNvSpPr>
-          <p:nvPr>
-            <p:ph type="dt" sz="half" idx="10"/>
+          <p:cNvPr id="9" name="Content Placeholder 8">
+            <a:extLst>
+              <a:ext uri="{FF2B5EF4-FFF2-40B4-BE49-F238E27FC236}">
+                <a16:creationId xmlns:a16="http://schemas.microsoft.com/office/drawing/2014/main" id="{ACDE61D8-A75A-F94B-B57A-46F276C03311}"/>
+              </a:ext>
+            </a:extLst>
+          </p:cNvPr>
+          <p:cNvSpPr>
+            <a:spLocks noGrp="1"/>
+          </p:cNvSpPr>
+          <p:nvPr>
+            <p:ph sz="half" idx="2"/>
           </p:nvPr>
         </p:nvSpPr>
         <p:spPr/>
         <p:txBody>
-          <a:bodyPr/>
-          <a:lstStyle/>
-          <a:p>
-            <a:fld id="{202E1EC2-47B8-044B-A09E-6A63B4D80C87}" type="datetime1">
-              <a:rPr lang="fi-FI" smtClean="0"/>
-              <a:t>25.1.2024</a:t>
-            </a:fld>
-            <a:endParaRPr lang="en-GB"/>
-          </a:p>
-        </p:txBody>
-      </p:sp>
-      <p:sp>
-        <p:nvSpPr>
-          <p:cNvPr id="6" name="Footer Placeholder 5">
-            <a:extLst>
-              <a:ext uri="{FF2B5EF4-FFF2-40B4-BE49-F238E27FC236}">
-                <a16:creationId xmlns:a16="http://schemas.microsoft.com/office/drawing/2014/main" id="{588CE607-4137-8840-8FEA-42EAC857E3A3}"/>
-              </a:ext>
-            </a:extLst>
-          </p:cNvPr>
-          <p:cNvSpPr>
-            <a:spLocks noGrp="1"/>
-          </p:cNvSpPr>
-          <p:nvPr>
-            <p:ph type="ftr" sz="quarter" idx="11"/>
-          </p:nvPr>
-        </p:nvSpPr>
-        <p:spPr/>
-        <p:txBody>
-          <a:bodyPr/>
-          <a:lstStyle/>
-          <a:p>
-            <a:endParaRPr lang="en-GB"/>
-          </a:p>
-        </p:txBody>
-      </p:sp>
-      <p:sp>
-        <p:nvSpPr>
-          <p:cNvPr id="7" name="Slide Number Placeholder 6">
-            <a:extLst>
-              <a:ext uri="{FF2B5EF4-FFF2-40B4-BE49-F238E27FC236}">
-                <a16:creationId xmlns:a16="http://schemas.microsoft.com/office/drawing/2014/main" id="{2E133A96-6C73-0844-B8CB-27C2B5F4CFB1}"/>
-              </a:ext>
-            </a:extLst>
-          </p:cNvPr>
-          <p:cNvSpPr>
-            <a:spLocks noGrp="1"/>
-          </p:cNvSpPr>
-          <p:nvPr>
-            <p:ph type="sldNum" sz="quarter" idx="12"/>
-          </p:nvPr>
-        </p:nvSpPr>
-        <p:spPr/>
-        <p:txBody>
-          <a:bodyPr/>
-          <a:lstStyle/>
-          <a:p>
-            <a:fld id="{76BAB7ED-EDE9-4D4B-9A2D-30E18C47C16E}" type="slidenum">
-              <a:rPr lang="en-GB" smtClean="0"/>
-              <a:t>8</a:t>
-            </a:fld>
-            <a:endParaRPr lang="en-GB"/>
-          </a:p>
-        </p:txBody>
-      </p:sp>
-      <p:pic>
-        <p:nvPicPr>
-          <p:cNvPr id="10" name="Picture 9" descr="A screenshot of a computer&#10;&#10;Description automatically generated">
-            <a:extLst>
-              <a:ext uri="{FF2B5EF4-FFF2-40B4-BE49-F238E27FC236}">
-                <a16:creationId xmlns:a16="http://schemas.microsoft.com/office/drawing/2014/main" id="{0B651A1E-9BED-B689-916E-442E238ECDEE}"/>
-              </a:ext>
-            </a:extLst>
-          </p:cNvPr>
-          <p:cNvPicPr>
-            <a:picLocks noChangeAspect="1"/>
-          </p:cNvPicPr>
-          <p:nvPr/>
-        </p:nvPicPr>
-        <p:blipFill>
-          <a:blip r:embed="rId2"/>
-          <a:stretch>
-            <a:fillRect/>
-          </a:stretch>
-        </p:blipFill>
-        <p:spPr>
-          <a:xfrm>
-            <a:off x="1723127" y="1014668"/>
-            <a:ext cx="10283938" cy="4065904"/>
-          </a:xfrm>
-          <a:prstGeom prst="rect">
-            <a:avLst/>
-          </a:prstGeom>
-        </p:spPr>
-      </p:pic>
-      <p:sp>
-        <p:nvSpPr>
-          <p:cNvPr id="11" name="TextBox 10">
-            <a:extLst>
-              <a:ext uri="{FF2B5EF4-FFF2-40B4-BE49-F238E27FC236}">
-                <a16:creationId xmlns:a16="http://schemas.microsoft.com/office/drawing/2014/main" id="{A556BAEC-3128-42E0-F30F-6A4F790BB1BB}"/>
-              </a:ext>
-            </a:extLst>
-          </p:cNvPr>
-          <p:cNvSpPr txBox="1"/>
-          <p:nvPr/>
-        </p:nvSpPr>
-        <p:spPr>
-          <a:xfrm>
-            <a:off x="423643" y="4837163"/>
-            <a:ext cx="2844344" cy="646331"/>
-          </a:xfrm>
-          <a:prstGeom prst="rect">
-            <a:avLst/>
-          </a:prstGeom>
-          <a:noFill/>
-        </p:spPr>
-        <p:txBody>
-          <a:bodyPr wrap="square">
-            <a:spAutoFit/>
+          <a:bodyPr>
+            <a:normAutofit/>
           </a:bodyPr>
           <a:lstStyle/>
           <a:p>
+            <a:pPr>
+              <a:lnSpc>
+                <a:spcPct val="107000"/>
+              </a:lnSpc>
+              <a:spcAft>
+                <a:spcPts val="800"/>
+              </a:spcAft>
+            </a:pPr>
             <a:r>
               <a:rPr lang="en-US" sz="1800" dirty="0">
                 <a:effectLst/>
@@ -10914,16 +11236,163 @@
                 <a:ea typeface="Calibri" panose="020F0502020204030204" pitchFamily="34" charset="0"/>
                 <a:cs typeface="Times New Roman" panose="02020603050405020304" pitchFamily="18" charset="0"/>
               </a:rPr>
-              <a:t>Source: https://docs.docker.com</a:t>
-            </a:r>
+              <a:t>Your ‘script’ for making your own Docker images. </a:t>
+            </a:r>
+          </a:p>
+          <a:p>
+            <a:pPr>
+              <a:lnSpc>
+                <a:spcPct val="107000"/>
+              </a:lnSpc>
+              <a:spcAft>
+                <a:spcPts val="800"/>
+              </a:spcAft>
+            </a:pPr>
+            <a:r>
+              <a:rPr lang="en-US" sz="1800" dirty="0">
+                <a:effectLst/>
+                <a:latin typeface="Calibri" panose="020F0502020204030204" pitchFamily="34" charset="0"/>
+                <a:ea typeface="Calibri" panose="020F0502020204030204" pitchFamily="34" charset="0"/>
+                <a:cs typeface="Times New Roman" panose="02020603050405020304" pitchFamily="18" charset="0"/>
+              </a:rPr>
+              <a:t>Image could be built based on source code and other assets on your disk </a:t>
+            </a:r>
+          </a:p>
+          <a:p>
+            <a:pPr lvl="1">
+              <a:lnSpc>
+                <a:spcPct val="107000"/>
+              </a:lnSpc>
+              <a:spcAft>
+                <a:spcPts val="800"/>
+              </a:spcAft>
+            </a:pPr>
+            <a:r>
+              <a:rPr lang="en-US" dirty="0">
+                <a:effectLst/>
+                <a:latin typeface="Calibri" panose="020F0502020204030204" pitchFamily="34" charset="0"/>
+                <a:ea typeface="Calibri" panose="020F0502020204030204" pitchFamily="34" charset="0"/>
+                <a:cs typeface="Times New Roman" panose="02020603050405020304" pitchFamily="18" charset="0"/>
+              </a:rPr>
+              <a:t>and, if needed, based on / expanding on ready-made images from </a:t>
+            </a:r>
+            <a:r>
+              <a:rPr lang="en-US" i="1" dirty="0">
+                <a:effectLst/>
+                <a:latin typeface="Calibri" panose="020F0502020204030204" pitchFamily="34" charset="0"/>
+                <a:ea typeface="Calibri" panose="020F0502020204030204" pitchFamily="34" charset="0"/>
+                <a:cs typeface="Times New Roman" panose="02020603050405020304" pitchFamily="18" charset="0"/>
+              </a:rPr>
+              <a:t>Docker Hub</a:t>
+            </a:r>
+            <a:r>
+              <a:rPr lang="en-US" dirty="0">
+                <a:effectLst/>
+                <a:latin typeface="Calibri" panose="020F0502020204030204" pitchFamily="34" charset="0"/>
+                <a:ea typeface="Calibri" panose="020F0502020204030204" pitchFamily="34" charset="0"/>
+                <a:cs typeface="Times New Roman" panose="02020603050405020304" pitchFamily="18" charset="0"/>
+              </a:rPr>
+              <a:t> or other docker image registry.</a:t>
+            </a:r>
+            <a:endParaRPr lang="fi-FI" dirty="0">
+              <a:effectLst/>
+              <a:latin typeface="Calibri" panose="020F0502020204030204" pitchFamily="34" charset="0"/>
+              <a:ea typeface="Calibri" panose="020F0502020204030204" pitchFamily="34" charset="0"/>
+              <a:cs typeface="Times New Roman" panose="02020603050405020304" pitchFamily="18" charset="0"/>
+            </a:endParaRPr>
+          </a:p>
+          <a:p>
             <a:endParaRPr lang="fi-FI" dirty="0"/>
+          </a:p>
+        </p:txBody>
+      </p:sp>
+      <p:sp>
+        <p:nvSpPr>
+          <p:cNvPr id="5" name="Date Placeholder 4">
+            <a:extLst>
+              <a:ext uri="{FF2B5EF4-FFF2-40B4-BE49-F238E27FC236}">
+                <a16:creationId xmlns:a16="http://schemas.microsoft.com/office/drawing/2014/main" id="{976244E2-AA76-2742-B2EC-FEC79276155C}"/>
+              </a:ext>
+            </a:extLst>
+          </p:cNvPr>
+          <p:cNvSpPr>
+            <a:spLocks noGrp="1"/>
+          </p:cNvSpPr>
+          <p:nvPr>
+            <p:ph type="dt" sz="half" idx="10"/>
+          </p:nvPr>
+        </p:nvSpPr>
+        <p:spPr/>
+        <p:txBody>
+          <a:bodyPr/>
+          <a:lstStyle/>
+          <a:p>
+            <a:fld id="{202E1EC2-47B8-044B-A09E-6A63B4D80C87}" type="datetime1">
+              <a:rPr lang="fi-FI" smtClean="0"/>
+              <a:t>18.2.2024</a:t>
+            </a:fld>
+            <a:endParaRPr lang="en-GB"/>
+          </a:p>
+        </p:txBody>
+      </p:sp>
+      <p:sp>
+        <p:nvSpPr>
+          <p:cNvPr id="6" name="Footer Placeholder 5">
+            <a:extLst>
+              <a:ext uri="{FF2B5EF4-FFF2-40B4-BE49-F238E27FC236}">
+                <a16:creationId xmlns:a16="http://schemas.microsoft.com/office/drawing/2014/main" id="{588CE607-4137-8840-8FEA-42EAC857E3A3}"/>
+              </a:ext>
+            </a:extLst>
+          </p:cNvPr>
+          <p:cNvSpPr>
+            <a:spLocks noGrp="1"/>
+          </p:cNvSpPr>
+          <p:nvPr>
+            <p:ph type="ftr" sz="quarter" idx="11"/>
+          </p:nvPr>
+        </p:nvSpPr>
+        <p:spPr/>
+        <p:txBody>
+          <a:bodyPr/>
+          <a:lstStyle/>
+          <a:p>
+            <a:endParaRPr lang="en-GB"/>
+          </a:p>
+        </p:txBody>
+      </p:sp>
+      <p:sp>
+        <p:nvSpPr>
+          <p:cNvPr id="7" name="Slide Number Placeholder 6">
+            <a:extLst>
+              <a:ext uri="{FF2B5EF4-FFF2-40B4-BE49-F238E27FC236}">
+                <a16:creationId xmlns:a16="http://schemas.microsoft.com/office/drawing/2014/main" id="{2E133A96-6C73-0844-B8CB-27C2B5F4CFB1}"/>
+              </a:ext>
+            </a:extLst>
+          </p:cNvPr>
+          <p:cNvSpPr>
+            <a:spLocks noGrp="1"/>
+          </p:cNvSpPr>
+          <p:nvPr>
+            <p:ph type="sldNum" sz="quarter" idx="12"/>
+          </p:nvPr>
+        </p:nvSpPr>
+        <p:spPr/>
+        <p:txBody>
+          <a:bodyPr/>
+          <a:lstStyle/>
+          <a:p>
+            <a:fld id="{76BAB7ED-EDE9-4D4B-9A2D-30E18C47C16E}" type="slidenum">
+              <a:rPr lang="en-GB" smtClean="0"/>
+              <a:t>8</a:t>
+            </a:fld>
+            <a:endParaRPr lang="en-GB"/>
           </a:p>
         </p:txBody>
       </p:sp>
     </p:spTree>
     <p:extLst>
       <p:ext uri="{BB962C8B-B14F-4D97-AF65-F5344CB8AC3E}">
-        <p14:creationId xmlns:p14="http://schemas.microsoft.com/office/powerpoint/2010/main" val="2851349343"/>
+        <p14:creationId xmlns:p14="http://schemas.microsoft.com/office/powerpoint/2010/main" val="1689429107"/>
       </p:ext>
     </p:extLst>
   </p:cSld>
@@ -10972,12 +11441,8 @@
           <a:lstStyle/>
           <a:p>
             <a:r>
-              <a:rPr lang="fi-FI" dirty="0"/>
-              <a:t>.</a:t>
-            </a:r>
-            <a:r>
               <a:rPr lang="fi-FI" dirty="0" err="1"/>
-              <a:t>dockerignore</a:t>
+              <a:t>Dockerfile</a:t>
             </a:r>
             <a:endParaRPr lang="fi-FI" dirty="0"/>
           </a:p>
@@ -10985,35 +11450,145 @@
       </p:sp>
       <p:sp>
         <p:nvSpPr>
-          <p:cNvPr id="9" name="Content Placeholder 8">
-            <a:extLst>
-              <a:ext uri="{FF2B5EF4-FFF2-40B4-BE49-F238E27FC236}">
-                <a16:creationId xmlns:a16="http://schemas.microsoft.com/office/drawing/2014/main" id="{ACDE61D8-A75A-F94B-B57A-46F276C03311}"/>
-              </a:ext>
-            </a:extLst>
-          </p:cNvPr>
-          <p:cNvSpPr>
-            <a:spLocks noGrp="1"/>
-          </p:cNvSpPr>
-          <p:nvPr>
-            <p:ph sz="half" idx="2"/>
+          <p:cNvPr id="5" name="Date Placeholder 4">
+            <a:extLst>
+              <a:ext uri="{FF2B5EF4-FFF2-40B4-BE49-F238E27FC236}">
+                <a16:creationId xmlns:a16="http://schemas.microsoft.com/office/drawing/2014/main" id="{976244E2-AA76-2742-B2EC-FEC79276155C}"/>
+              </a:ext>
+            </a:extLst>
+          </p:cNvPr>
+          <p:cNvSpPr>
+            <a:spLocks noGrp="1"/>
+          </p:cNvSpPr>
+          <p:nvPr>
+            <p:ph type="dt" sz="half" idx="10"/>
           </p:nvPr>
         </p:nvSpPr>
         <p:spPr/>
         <p:txBody>
-          <a:bodyPr>
-            <a:normAutofit/>
+          <a:bodyPr/>
+          <a:lstStyle/>
+          <a:p>
+            <a:fld id="{202E1EC2-47B8-044B-A09E-6A63B4D80C87}" type="datetime1">
+              <a:rPr lang="fi-FI" smtClean="0"/>
+              <a:t>18.2.2024</a:t>
+            </a:fld>
+            <a:endParaRPr lang="en-GB"/>
+          </a:p>
+        </p:txBody>
+      </p:sp>
+      <p:sp>
+        <p:nvSpPr>
+          <p:cNvPr id="6" name="Footer Placeholder 5">
+            <a:extLst>
+              <a:ext uri="{FF2B5EF4-FFF2-40B4-BE49-F238E27FC236}">
+                <a16:creationId xmlns:a16="http://schemas.microsoft.com/office/drawing/2014/main" id="{588CE607-4137-8840-8FEA-42EAC857E3A3}"/>
+              </a:ext>
+            </a:extLst>
+          </p:cNvPr>
+          <p:cNvSpPr>
+            <a:spLocks noGrp="1"/>
+          </p:cNvSpPr>
+          <p:nvPr>
+            <p:ph type="ftr" sz="quarter" idx="11"/>
+          </p:nvPr>
+        </p:nvSpPr>
+        <p:spPr/>
+        <p:txBody>
+          <a:bodyPr/>
+          <a:lstStyle/>
+          <a:p>
+            <a:endParaRPr lang="en-GB"/>
+          </a:p>
+        </p:txBody>
+      </p:sp>
+      <p:sp>
+        <p:nvSpPr>
+          <p:cNvPr id="7" name="Slide Number Placeholder 6">
+            <a:extLst>
+              <a:ext uri="{FF2B5EF4-FFF2-40B4-BE49-F238E27FC236}">
+                <a16:creationId xmlns:a16="http://schemas.microsoft.com/office/drawing/2014/main" id="{2E133A96-6C73-0844-B8CB-27C2B5F4CFB1}"/>
+              </a:ext>
+            </a:extLst>
+          </p:cNvPr>
+          <p:cNvSpPr>
+            <a:spLocks noGrp="1"/>
+          </p:cNvSpPr>
+          <p:nvPr>
+            <p:ph type="sldNum" sz="quarter" idx="12"/>
+          </p:nvPr>
+        </p:nvSpPr>
+        <p:spPr/>
+        <p:txBody>
+          <a:bodyPr/>
+          <a:lstStyle/>
+          <a:p>
+            <a:fld id="{76BAB7ED-EDE9-4D4B-9A2D-30E18C47C16E}" type="slidenum">
+              <a:rPr lang="en-GB" smtClean="0"/>
+              <a:t>9</a:t>
+            </a:fld>
+            <a:endParaRPr lang="en-GB"/>
+          </a:p>
+        </p:txBody>
+      </p:sp>
+      <p:pic>
+        <p:nvPicPr>
+          <p:cNvPr id="10" name="Picture 9" descr="A screenshot of a computer&#10;&#10;Description automatically generated">
+            <a:extLst>
+              <a:ext uri="{FF2B5EF4-FFF2-40B4-BE49-F238E27FC236}">
+                <a16:creationId xmlns:a16="http://schemas.microsoft.com/office/drawing/2014/main" id="{0B651A1E-9BED-B689-916E-442E238ECDEE}"/>
+              </a:ext>
+            </a:extLst>
+          </p:cNvPr>
+          <p:cNvPicPr>
+            <a:picLocks noChangeAspect="1"/>
+          </p:cNvPicPr>
+          <p:nvPr/>
+        </p:nvPicPr>
+        <p:blipFill>
+          <a:blip r:embed="rId2"/>
+          <a:stretch>
+            <a:fillRect/>
+          </a:stretch>
+        </p:blipFill>
+        <p:spPr>
+          <a:xfrm>
+            <a:off x="1723127" y="1014668"/>
+            <a:ext cx="10283938" cy="4065904"/>
+          </a:xfrm>
+          <a:prstGeom prst="rect">
+            <a:avLst/>
+          </a:prstGeom>
+        </p:spPr>
+      </p:pic>
+      <p:sp>
+        <p:nvSpPr>
+          <p:cNvPr id="11" name="TextBox 10">
+            <a:extLst>
+              <a:ext uri="{FF2B5EF4-FFF2-40B4-BE49-F238E27FC236}">
+                <a16:creationId xmlns:a16="http://schemas.microsoft.com/office/drawing/2014/main" id="{A556BAEC-3128-42E0-F30F-6A4F790BB1BB}"/>
+              </a:ext>
+            </a:extLst>
+          </p:cNvPr>
+          <p:cNvSpPr txBox="1"/>
+          <p:nvPr/>
+        </p:nvSpPr>
+        <p:spPr>
+          <a:xfrm>
+            <a:off x="423643" y="4837163"/>
+            <a:ext cx="2844344" cy="646331"/>
+          </a:xfrm>
+          <a:prstGeom prst="rect">
+            <a:avLst/>
+          </a:prstGeom>
+          <a:noFill/>
+        </p:spPr>
+        <p:txBody>
+          <a:bodyPr wrap="square">
+            <a:spAutoFit/>
           </a:bodyPr>
           <a:lstStyle/>
           <a:p>
-            <a:pPr>
-              <a:lnSpc>
-                <a:spcPct val="107000"/>
-              </a:lnSpc>
-              <a:spcAft>
-                <a:spcPts val="800"/>
-              </a:spcAft>
-            </a:pPr>
             <a:r>
               <a:rPr lang="en-US" sz="1800" dirty="0">
                 <a:effectLst/>
@@ -11021,107 +11596,16 @@
                 <a:ea typeface="Calibri" panose="020F0502020204030204" pitchFamily="34" charset="0"/>
                 <a:cs typeface="Times New Roman" panose="02020603050405020304" pitchFamily="18" charset="0"/>
               </a:rPr>
-              <a:t>Lists which files and folders won’t be packed into the Docker image.</a:t>
-            </a:r>
-            <a:endParaRPr lang="fi-FI" dirty="0">
-              <a:effectLst/>
-              <a:latin typeface="Calibri" panose="020F0502020204030204" pitchFamily="34" charset="0"/>
-              <a:ea typeface="Calibri" panose="020F0502020204030204" pitchFamily="34" charset="0"/>
-              <a:cs typeface="Times New Roman" panose="02020603050405020304" pitchFamily="18" charset="0"/>
-            </a:endParaRPr>
-          </a:p>
-          <a:p>
+              <a:t>Source: https://docs.docker.com</a:t>
+            </a:r>
             <a:endParaRPr lang="fi-FI" dirty="0"/>
-          </a:p>
-        </p:txBody>
-      </p:sp>
-      <p:sp>
-        <p:nvSpPr>
-          <p:cNvPr id="5" name="Date Placeholder 4">
-            <a:extLst>
-              <a:ext uri="{FF2B5EF4-FFF2-40B4-BE49-F238E27FC236}">
-                <a16:creationId xmlns:a16="http://schemas.microsoft.com/office/drawing/2014/main" id="{976244E2-AA76-2742-B2EC-FEC79276155C}"/>
-              </a:ext>
-            </a:extLst>
-          </p:cNvPr>
-          <p:cNvSpPr>
-            <a:spLocks noGrp="1"/>
-          </p:cNvSpPr>
-          <p:nvPr>
-            <p:ph type="dt" sz="half" idx="10"/>
-          </p:nvPr>
-        </p:nvSpPr>
-        <p:spPr/>
-        <p:txBody>
-          <a:bodyPr/>
-          <a:lstStyle/>
-          <a:p>
-            <a:fld id="{202E1EC2-47B8-044B-A09E-6A63B4D80C87}" type="datetime1">
-              <a:rPr lang="fi-FI" smtClean="0"/>
-              <a:t>25.1.2024</a:t>
-            </a:fld>
-            <a:endParaRPr lang="en-GB"/>
-          </a:p>
-        </p:txBody>
-      </p:sp>
-      <p:sp>
-        <p:nvSpPr>
-          <p:cNvPr id="6" name="Footer Placeholder 5">
-            <a:extLst>
-              <a:ext uri="{FF2B5EF4-FFF2-40B4-BE49-F238E27FC236}">
-                <a16:creationId xmlns:a16="http://schemas.microsoft.com/office/drawing/2014/main" id="{588CE607-4137-8840-8FEA-42EAC857E3A3}"/>
-              </a:ext>
-            </a:extLst>
-          </p:cNvPr>
-          <p:cNvSpPr>
-            <a:spLocks noGrp="1"/>
-          </p:cNvSpPr>
-          <p:nvPr>
-            <p:ph type="ftr" sz="quarter" idx="11"/>
-          </p:nvPr>
-        </p:nvSpPr>
-        <p:spPr/>
-        <p:txBody>
-          <a:bodyPr/>
-          <a:lstStyle/>
-          <a:p>
-            <a:endParaRPr lang="en-GB"/>
-          </a:p>
-        </p:txBody>
-      </p:sp>
-      <p:sp>
-        <p:nvSpPr>
-          <p:cNvPr id="7" name="Slide Number Placeholder 6">
-            <a:extLst>
-              <a:ext uri="{FF2B5EF4-FFF2-40B4-BE49-F238E27FC236}">
-                <a16:creationId xmlns:a16="http://schemas.microsoft.com/office/drawing/2014/main" id="{2E133A96-6C73-0844-B8CB-27C2B5F4CFB1}"/>
-              </a:ext>
-            </a:extLst>
-          </p:cNvPr>
-          <p:cNvSpPr>
-            <a:spLocks noGrp="1"/>
-          </p:cNvSpPr>
-          <p:nvPr>
-            <p:ph type="sldNum" sz="quarter" idx="12"/>
-          </p:nvPr>
-        </p:nvSpPr>
-        <p:spPr/>
-        <p:txBody>
-          <a:bodyPr/>
-          <a:lstStyle/>
-          <a:p>
-            <a:fld id="{76BAB7ED-EDE9-4D4B-9A2D-30E18C47C16E}" type="slidenum">
-              <a:rPr lang="en-GB" smtClean="0"/>
-              <a:t>9</a:t>
-            </a:fld>
-            <a:endParaRPr lang="en-GB"/>
           </a:p>
         </p:txBody>
       </p:sp>
     </p:spTree>
     <p:extLst>
       <p:ext uri="{BB962C8B-B14F-4D97-AF65-F5344CB8AC3E}">
-        <p14:creationId xmlns:p14="http://schemas.microsoft.com/office/powerpoint/2010/main" val="3023738396"/>
+        <p14:creationId xmlns:p14="http://schemas.microsoft.com/office/powerpoint/2010/main" val="2851349343"/>
       </p:ext>
     </p:extLst>
   </p:cSld>
@@ -11688,21 +12172,21 @@
 </file>
 
 <file path=customXml/item1.xml><?xml version="1.0" encoding="utf-8"?>
+<p:properties xmlns:p="http://schemas.microsoft.com/office/2006/metadata/properties" xmlns:xsi="http://www.w3.org/2001/XMLSchema-instance" xmlns:pc="http://schemas.microsoft.com/office/infopath/2007/PartnerControls">
+  <documentManagement>
+    <PublishingExpirationDate xmlns="http://schemas.microsoft.com/sharepoint/v3" xsi:nil="true"/>
+    <PublishingStartDate xmlns="http://schemas.microsoft.com/sharepoint/v3" xsi:nil="true"/>
+  </documentManagement>
+</p:properties>
+</file>
+
+<file path=customXml/item2.xml><?xml version="1.0" encoding="utf-8"?>
 <?mso-contentType ?>
 <FormTemplates xmlns="http://schemas.microsoft.com/sharepoint/v3/contenttype/forms">
   <Display>DocumentLibraryForm</Display>
   <Edit>DocumentLibraryForm</Edit>
   <New>DocumentLibraryForm</New>
 </FormTemplates>
-</file>
-
-<file path=customXml/item2.xml><?xml version="1.0" encoding="utf-8"?>
-<p:properties xmlns:p="http://schemas.microsoft.com/office/2006/metadata/properties" xmlns:xsi="http://www.w3.org/2001/XMLSchema-instance" xmlns:pc="http://schemas.microsoft.com/office/infopath/2007/PartnerControls">
-  <documentManagement>
-    <PublishingExpirationDate xmlns="http://schemas.microsoft.com/sharepoint/v3" xsi:nil="true"/>
-    <PublishingStartDate xmlns="http://schemas.microsoft.com/sharepoint/v3" xsi:nil="true"/>
-  </documentManagement>
-</p:properties>
 </file>
 
 <file path=customXml/item3.xml><?xml version="1.0" encoding="utf-8"?>
@@ -11838,14 +12322,6 @@
 </file>
 
 <file path=customXml/itemProps1.xml><?xml version="1.0" encoding="utf-8"?>
-<ds:datastoreItem xmlns:ds="http://schemas.openxmlformats.org/officeDocument/2006/customXml" ds:itemID="{D546C03B-CD3A-4EA0-AAA4-0E00E896454E}">
-  <ds:schemaRefs>
-    <ds:schemaRef ds:uri="http://schemas.microsoft.com/sharepoint/v3/contenttype/forms"/>
-  </ds:schemaRefs>
-</ds:datastoreItem>
-</file>
-
-<file path=customXml/itemProps2.xml><?xml version="1.0" encoding="utf-8"?>
 <ds:datastoreItem xmlns:ds="http://schemas.openxmlformats.org/officeDocument/2006/customXml" ds:itemID="{DED4E12E-7268-4B03-A47B-0755D62B5E31}">
   <ds:schemaRefs>
     <ds:schemaRef ds:uri="http://schemas.microsoft.com/sharepoint/v3"/>
@@ -11857,6 +12333,14 @@
     <ds:schemaRef ds:uri="http://schemas.openxmlformats.org/package/2006/metadata/core-properties"/>
     <ds:schemaRef ds:uri="http://schemas.microsoft.com/office/2006/metadata/properties"/>
     <ds:schemaRef ds:uri="http://www.w3.org/XML/1998/namespace"/>
+  </ds:schemaRefs>
+</ds:datastoreItem>
+</file>
+
+<file path=customXml/itemProps2.xml><?xml version="1.0" encoding="utf-8"?>
+<ds:datastoreItem xmlns:ds="http://schemas.openxmlformats.org/officeDocument/2006/customXml" ds:itemID="{D546C03B-CD3A-4EA0-AAA4-0E00E896454E}">
+  <ds:schemaRefs>
+    <ds:schemaRef ds:uri="http://schemas.microsoft.com/sharepoint/v3/contenttype/forms"/>
   </ds:schemaRefs>
 </ds:datastoreItem>
 </file>

</xml_diff>